<commit_message>
REST poprawki do prezentacji
</commit_message>
<xml_diff>
--- a/WDSR - ćwiczenie 3a_REST.pptx
+++ b/WDSR - ćwiczenie 3a_REST.pptx
@@ -5,10 +5,10 @@
     <p:sldMasterId id="2147483669" r:id="rId5"/>
   </p:sldMasterIdLst>
   <p:notesMasterIdLst>
-    <p:notesMasterId r:id="rId42"/>
+    <p:notesMasterId r:id="rId41"/>
   </p:notesMasterIdLst>
   <p:handoutMasterIdLst>
-    <p:handoutMasterId r:id="rId43"/>
+    <p:handoutMasterId r:id="rId42"/>
   </p:handoutMasterIdLst>
   <p:sldIdLst>
     <p:sldId id="286" r:id="rId6"/>
@@ -42,11 +42,10 @@
     <p:sldId id="424" r:id="rId34"/>
     <p:sldId id="426" r:id="rId35"/>
     <p:sldId id="427" r:id="rId36"/>
-    <p:sldId id="428" r:id="rId37"/>
-    <p:sldId id="430" r:id="rId38"/>
-    <p:sldId id="431" r:id="rId39"/>
-    <p:sldId id="432" r:id="rId40"/>
-    <p:sldId id="324" r:id="rId41"/>
+    <p:sldId id="430" r:id="rId37"/>
+    <p:sldId id="431" r:id="rId38"/>
+    <p:sldId id="432" r:id="rId39"/>
+    <p:sldId id="324" r:id="rId40"/>
   </p:sldIdLst>
   <p:sldSz cx="9144000" cy="5143500" type="screen16x9"/>
   <p:notesSz cx="6858000" cy="9144000"/>
@@ -147,7 +146,7 @@
   </p:defaultTextStyle>
   <p:extLst>
     <p:ext uri="{EFAFB233-063F-42B5-8137-9DF3F51BA10A}">
-      <p15:sldGuideLst xmlns:p15="http://schemas.microsoft.com/office/powerpoint/2012/main" xmlns="">
+      <p15:sldGuideLst xmlns="" xmlns:p15="http://schemas.microsoft.com/office/powerpoint/2012/main">
         <p15:guide id="1" orient="horz" pos="1620">
           <p15:clr>
             <a:srgbClr val="A4A3A4"/>
@@ -181,7 +180,7 @@
       </p15:sldGuideLst>
     </p:ext>
     <p:ext uri="{2D200454-40CA-4A62-9FC3-DE9A4176ACB9}">
-      <p15:notesGuideLst xmlns:p15="http://schemas.microsoft.com/office/powerpoint/2012/main" xmlns=""/>
+      <p15:notesGuideLst xmlns="" xmlns:p15="http://schemas.microsoft.com/office/powerpoint/2012/main"/>
     </p:ext>
   </p:extLst>
 </p:presentation>
@@ -276,7 +275,7 @@
             <a:fld id="{C4843D26-F355-3844-A4EF-19D4FD875597}" type="datetimeFigureOut">
               <a:rPr lang="de-DE" smtClean="0"/>
               <a:pPr/>
-              <a:t>26.03.2017</a:t>
+              <a:t>04.04.2017</a:t>
             </a:fld>
             <a:endParaRPr lang="de-DE" dirty="0"/>
           </a:p>
@@ -352,7 +351,7 @@
     </p:spTree>
     <p:extLst>
       <p:ext uri="{BB962C8B-B14F-4D97-AF65-F5344CB8AC3E}">
-        <p14:creationId xmlns="" xmlns:p14="http://schemas.microsoft.com/office/powerpoint/2010/main" val="1863735379"/>
+        <p14:creationId xmlns:p14="http://schemas.microsoft.com/office/powerpoint/2010/main" xmlns="" val="1863735379"/>
       </p:ext>
     </p:extLst>
   </p:cSld>
@@ -444,7 +443,7 @@
             <a:fld id="{8E2CFE12-C1FB-D740-8B6C-AFB72D5D4002}" type="datetimeFigureOut">
               <a:rPr lang="de-DE" smtClean="0"/>
               <a:pPr/>
-              <a:t>26.03.2017</a:t>
+              <a:t>04.04.2017</a:t>
             </a:fld>
             <a:endParaRPr lang="de-DE" dirty="0"/>
           </a:p>
@@ -613,7 +612,7 @@
     </p:spTree>
     <p:extLst>
       <p:ext uri="{BB962C8B-B14F-4D97-AF65-F5344CB8AC3E}">
-        <p14:creationId xmlns="" xmlns:p14="http://schemas.microsoft.com/office/powerpoint/2010/main" val="1832403913"/>
+        <p14:creationId xmlns:p14="http://schemas.microsoft.com/office/powerpoint/2010/main" xmlns="" val="1832403913"/>
       </p:ext>
     </p:extLst>
   </p:cSld>
@@ -791,7 +790,7 @@
     </p:spTree>
     <p:extLst>
       <p:ext uri="{BB962C8B-B14F-4D97-AF65-F5344CB8AC3E}">
-        <p14:creationId xmlns="" xmlns:p14="http://schemas.microsoft.com/office/powerpoint/2010/main" val="1775613547"/>
+        <p14:creationId xmlns:p14="http://schemas.microsoft.com/office/powerpoint/2010/main" xmlns="" val="1775613547"/>
       </p:ext>
     </p:extLst>
   </p:cSld>
@@ -878,7 +877,7 @@
     </p:spTree>
     <p:extLst>
       <p:ext uri="{BB962C8B-B14F-4D97-AF65-F5344CB8AC3E}">
-        <p14:creationId xmlns="" xmlns:p14="http://schemas.microsoft.com/office/powerpoint/2010/main" val="1883132698"/>
+        <p14:creationId xmlns:p14="http://schemas.microsoft.com/office/powerpoint/2010/main" xmlns="" val="1883132698"/>
       </p:ext>
     </p:extLst>
   </p:cSld>
@@ -965,7 +964,7 @@
     </p:spTree>
     <p:extLst>
       <p:ext uri="{BB962C8B-B14F-4D97-AF65-F5344CB8AC3E}">
-        <p14:creationId xmlns="" xmlns:p14="http://schemas.microsoft.com/office/powerpoint/2010/main" val="1883132698"/>
+        <p14:creationId xmlns:p14="http://schemas.microsoft.com/office/powerpoint/2010/main" xmlns="" val="1883132698"/>
       </p:ext>
     </p:extLst>
   </p:cSld>
@@ -1052,7 +1051,7 @@
     </p:spTree>
     <p:extLst>
       <p:ext uri="{BB962C8B-B14F-4D97-AF65-F5344CB8AC3E}">
-        <p14:creationId xmlns="" xmlns:p14="http://schemas.microsoft.com/office/powerpoint/2010/main" val="1883132698"/>
+        <p14:creationId xmlns:p14="http://schemas.microsoft.com/office/powerpoint/2010/main" xmlns="" val="1883132698"/>
       </p:ext>
     </p:extLst>
   </p:cSld>
@@ -1139,7 +1138,7 @@
     </p:spTree>
     <p:extLst>
       <p:ext uri="{BB962C8B-B14F-4D97-AF65-F5344CB8AC3E}">
-        <p14:creationId xmlns="" xmlns:p14="http://schemas.microsoft.com/office/powerpoint/2010/main" val="1883132698"/>
+        <p14:creationId xmlns:p14="http://schemas.microsoft.com/office/powerpoint/2010/main" xmlns="" val="1883132698"/>
       </p:ext>
     </p:extLst>
   </p:cSld>
@@ -1226,7 +1225,7 @@
     </p:spTree>
     <p:extLst>
       <p:ext uri="{BB962C8B-B14F-4D97-AF65-F5344CB8AC3E}">
-        <p14:creationId xmlns="" xmlns:p14="http://schemas.microsoft.com/office/powerpoint/2010/main" val="1883132698"/>
+        <p14:creationId xmlns:p14="http://schemas.microsoft.com/office/powerpoint/2010/main" xmlns="" val="1883132698"/>
       </p:ext>
     </p:extLst>
   </p:cSld>
@@ -1313,7 +1312,7 @@
     </p:spTree>
     <p:extLst>
       <p:ext uri="{BB962C8B-B14F-4D97-AF65-F5344CB8AC3E}">
-        <p14:creationId xmlns="" xmlns:p14="http://schemas.microsoft.com/office/powerpoint/2010/main" val="1883132698"/>
+        <p14:creationId xmlns:p14="http://schemas.microsoft.com/office/powerpoint/2010/main" xmlns="" val="1883132698"/>
       </p:ext>
     </p:extLst>
   </p:cSld>
@@ -1400,7 +1399,7 @@
     </p:spTree>
     <p:extLst>
       <p:ext uri="{BB962C8B-B14F-4D97-AF65-F5344CB8AC3E}">
-        <p14:creationId xmlns="" xmlns:p14="http://schemas.microsoft.com/office/powerpoint/2010/main" val="1883132698"/>
+        <p14:creationId xmlns:p14="http://schemas.microsoft.com/office/powerpoint/2010/main" xmlns="" val="1883132698"/>
       </p:ext>
     </p:extLst>
   </p:cSld>
@@ -1487,7 +1486,7 @@
     </p:spTree>
     <p:extLst>
       <p:ext uri="{BB962C8B-B14F-4D97-AF65-F5344CB8AC3E}">
-        <p14:creationId xmlns="" xmlns:p14="http://schemas.microsoft.com/office/powerpoint/2010/main" val="1883132698"/>
+        <p14:creationId xmlns:p14="http://schemas.microsoft.com/office/powerpoint/2010/main" xmlns="" val="1883132698"/>
       </p:ext>
     </p:extLst>
   </p:cSld>
@@ -1574,7 +1573,7 @@
     </p:spTree>
     <p:extLst>
       <p:ext uri="{BB962C8B-B14F-4D97-AF65-F5344CB8AC3E}">
-        <p14:creationId xmlns="" xmlns:p14="http://schemas.microsoft.com/office/powerpoint/2010/main" val="1883132698"/>
+        <p14:creationId xmlns:p14="http://schemas.microsoft.com/office/powerpoint/2010/main" xmlns="" val="1883132698"/>
       </p:ext>
     </p:extLst>
   </p:cSld>
@@ -1661,7 +1660,7 @@
     </p:spTree>
     <p:extLst>
       <p:ext uri="{BB962C8B-B14F-4D97-AF65-F5344CB8AC3E}">
-        <p14:creationId xmlns="" xmlns:p14="http://schemas.microsoft.com/office/powerpoint/2010/main" val="1883132698"/>
+        <p14:creationId xmlns:p14="http://schemas.microsoft.com/office/powerpoint/2010/main" xmlns="" val="1883132698"/>
       </p:ext>
     </p:extLst>
   </p:cSld>
@@ -1748,7 +1747,7 @@
     </p:spTree>
     <p:extLst>
       <p:ext uri="{BB962C8B-B14F-4D97-AF65-F5344CB8AC3E}">
-        <p14:creationId xmlns="" xmlns:p14="http://schemas.microsoft.com/office/powerpoint/2010/main" val="3849374475"/>
+        <p14:creationId xmlns:p14="http://schemas.microsoft.com/office/powerpoint/2010/main" xmlns="" val="3849374475"/>
       </p:ext>
     </p:extLst>
   </p:cSld>
@@ -1835,7 +1834,7 @@
     </p:spTree>
     <p:extLst>
       <p:ext uri="{BB962C8B-B14F-4D97-AF65-F5344CB8AC3E}">
-        <p14:creationId xmlns="" xmlns:p14="http://schemas.microsoft.com/office/powerpoint/2010/main" val="1883132698"/>
+        <p14:creationId xmlns:p14="http://schemas.microsoft.com/office/powerpoint/2010/main" xmlns="" val="1883132698"/>
       </p:ext>
     </p:extLst>
   </p:cSld>
@@ -1922,7 +1921,7 @@
     </p:spTree>
     <p:extLst>
       <p:ext uri="{BB962C8B-B14F-4D97-AF65-F5344CB8AC3E}">
-        <p14:creationId xmlns="" xmlns:p14="http://schemas.microsoft.com/office/powerpoint/2010/main" val="1883132698"/>
+        <p14:creationId xmlns:p14="http://schemas.microsoft.com/office/powerpoint/2010/main" xmlns="" val="1883132698"/>
       </p:ext>
     </p:extLst>
   </p:cSld>
@@ -2009,7 +2008,7 @@
     </p:spTree>
     <p:extLst>
       <p:ext uri="{BB962C8B-B14F-4D97-AF65-F5344CB8AC3E}">
-        <p14:creationId xmlns="" xmlns:p14="http://schemas.microsoft.com/office/powerpoint/2010/main" val="1883132698"/>
+        <p14:creationId xmlns:p14="http://schemas.microsoft.com/office/powerpoint/2010/main" xmlns="" val="1883132698"/>
       </p:ext>
     </p:extLst>
   </p:cSld>
@@ -2096,7 +2095,7 @@
     </p:spTree>
     <p:extLst>
       <p:ext uri="{BB962C8B-B14F-4D97-AF65-F5344CB8AC3E}">
-        <p14:creationId xmlns="" xmlns:p14="http://schemas.microsoft.com/office/powerpoint/2010/main" val="1883132698"/>
+        <p14:creationId xmlns:p14="http://schemas.microsoft.com/office/powerpoint/2010/main" xmlns="" val="1883132698"/>
       </p:ext>
     </p:extLst>
   </p:cSld>
@@ -2183,7 +2182,7 @@
     </p:spTree>
     <p:extLst>
       <p:ext uri="{BB962C8B-B14F-4D97-AF65-F5344CB8AC3E}">
-        <p14:creationId xmlns="" xmlns:p14="http://schemas.microsoft.com/office/powerpoint/2010/main" val="1883132698"/>
+        <p14:creationId xmlns:p14="http://schemas.microsoft.com/office/powerpoint/2010/main" xmlns="" val="1883132698"/>
       </p:ext>
     </p:extLst>
   </p:cSld>
@@ -2270,7 +2269,7 @@
     </p:spTree>
     <p:extLst>
       <p:ext uri="{BB962C8B-B14F-4D97-AF65-F5344CB8AC3E}">
-        <p14:creationId xmlns="" xmlns:p14="http://schemas.microsoft.com/office/powerpoint/2010/main" val="1883132698"/>
+        <p14:creationId xmlns:p14="http://schemas.microsoft.com/office/powerpoint/2010/main" xmlns="" val="1883132698"/>
       </p:ext>
     </p:extLst>
   </p:cSld>
@@ -2357,7 +2356,7 @@
     </p:spTree>
     <p:extLst>
       <p:ext uri="{BB962C8B-B14F-4D97-AF65-F5344CB8AC3E}">
-        <p14:creationId xmlns="" xmlns:p14="http://schemas.microsoft.com/office/powerpoint/2010/main" val="1883132698"/>
+        <p14:creationId xmlns:p14="http://schemas.microsoft.com/office/powerpoint/2010/main" xmlns="" val="1883132698"/>
       </p:ext>
     </p:extLst>
   </p:cSld>
@@ -2444,7 +2443,7 @@
     </p:spTree>
     <p:extLst>
       <p:ext uri="{BB962C8B-B14F-4D97-AF65-F5344CB8AC3E}">
-        <p14:creationId xmlns="" xmlns:p14="http://schemas.microsoft.com/office/powerpoint/2010/main" val="1883132698"/>
+        <p14:creationId xmlns:p14="http://schemas.microsoft.com/office/powerpoint/2010/main" xmlns="" val="1883132698"/>
       </p:ext>
     </p:extLst>
   </p:cSld>
@@ -2531,7 +2530,7 @@
     </p:spTree>
     <p:extLst>
       <p:ext uri="{BB962C8B-B14F-4D97-AF65-F5344CB8AC3E}">
-        <p14:creationId xmlns="" xmlns:p14="http://schemas.microsoft.com/office/powerpoint/2010/main" val="1883132698"/>
+        <p14:creationId xmlns:p14="http://schemas.microsoft.com/office/powerpoint/2010/main" xmlns="" val="1883132698"/>
       </p:ext>
     </p:extLst>
   </p:cSld>
@@ -2618,7 +2617,7 @@
     </p:spTree>
     <p:extLst>
       <p:ext uri="{BB962C8B-B14F-4D97-AF65-F5344CB8AC3E}">
-        <p14:creationId xmlns="" xmlns:p14="http://schemas.microsoft.com/office/powerpoint/2010/main" val="1883132698"/>
+        <p14:creationId xmlns:p14="http://schemas.microsoft.com/office/powerpoint/2010/main" xmlns="" val="1883132698"/>
       </p:ext>
     </p:extLst>
   </p:cSld>
@@ -2705,7 +2704,7 @@
     </p:spTree>
     <p:extLst>
       <p:ext uri="{BB962C8B-B14F-4D97-AF65-F5344CB8AC3E}">
-        <p14:creationId xmlns="" xmlns:p14="http://schemas.microsoft.com/office/powerpoint/2010/main" val="518439452"/>
+        <p14:creationId xmlns:p14="http://schemas.microsoft.com/office/powerpoint/2010/main" xmlns="" val="518439452"/>
       </p:ext>
     </p:extLst>
   </p:cSld>
@@ -2792,7 +2791,7 @@
     </p:spTree>
     <p:extLst>
       <p:ext uri="{BB962C8B-B14F-4D97-AF65-F5344CB8AC3E}">
-        <p14:creationId xmlns="" xmlns:p14="http://schemas.microsoft.com/office/powerpoint/2010/main" val="1883132698"/>
+        <p14:creationId xmlns:p14="http://schemas.microsoft.com/office/powerpoint/2010/main" xmlns="" val="1883132698"/>
       </p:ext>
     </p:extLst>
   </p:cSld>
@@ -2879,7 +2878,7 @@
     </p:spTree>
     <p:extLst>
       <p:ext uri="{BB962C8B-B14F-4D97-AF65-F5344CB8AC3E}">
-        <p14:creationId xmlns="" xmlns:p14="http://schemas.microsoft.com/office/powerpoint/2010/main" val="1883132698"/>
+        <p14:creationId xmlns:p14="http://schemas.microsoft.com/office/powerpoint/2010/main" xmlns="" val="1883132698"/>
       </p:ext>
     </p:extLst>
   </p:cSld>
@@ -2966,7 +2965,7 @@
     </p:spTree>
     <p:extLst>
       <p:ext uri="{BB962C8B-B14F-4D97-AF65-F5344CB8AC3E}">
-        <p14:creationId xmlns="" xmlns:p14="http://schemas.microsoft.com/office/powerpoint/2010/main" val="1883132698"/>
+        <p14:creationId xmlns:p14="http://schemas.microsoft.com/office/powerpoint/2010/main" xmlns="" val="1883132698"/>
       </p:ext>
     </p:extLst>
   </p:cSld>
@@ -3053,94 +3052,7 @@
     </p:spTree>
     <p:extLst>
       <p:ext uri="{BB962C8B-B14F-4D97-AF65-F5344CB8AC3E}">
-        <p14:creationId xmlns="" xmlns:p14="http://schemas.microsoft.com/office/powerpoint/2010/main" val="1883132698"/>
-      </p:ext>
-    </p:extLst>
-  </p:cSld>
-  <p:clrMapOvr>
-    <a:masterClrMapping/>
-  </p:clrMapOvr>
-</p:notes>
-</file>
-
-<file path=ppt/notesSlides/notesSlide34.xml><?xml version="1.0" encoding="utf-8"?>
-<p:notes xmlns:a="http://schemas.openxmlformats.org/drawingml/2006/main" xmlns:r="http://schemas.openxmlformats.org/officeDocument/2006/relationships" xmlns:p="http://schemas.openxmlformats.org/presentationml/2006/main">
-  <p:cSld>
-    <p:spTree>
-      <p:nvGrpSpPr>
-        <p:cNvPr id="1" name=""/>
-        <p:cNvGrpSpPr/>
-        <p:nvPr/>
-      </p:nvGrpSpPr>
-      <p:grpSpPr>
-        <a:xfrm>
-          <a:off x="0" y="0"/>
-          <a:ext cx="0" cy="0"/>
-          <a:chOff x="0" y="0"/>
-          <a:chExt cx="0" cy="0"/>
-        </a:xfrm>
-      </p:grpSpPr>
-      <p:sp>
-        <p:nvSpPr>
-          <p:cNvPr id="2" name="Folienbildplatzhalter 1"/>
-          <p:cNvSpPr>
-            <a:spLocks noGrp="1" noRot="1" noChangeAspect="1"/>
-          </p:cNvSpPr>
-          <p:nvPr>
-            <p:ph type="sldImg"/>
-          </p:nvPr>
-        </p:nvSpPr>
-        <p:spPr/>
-      </p:sp>
-      <p:sp>
-        <p:nvSpPr>
-          <p:cNvPr id="3" name="Notizenplatzhalter 2"/>
-          <p:cNvSpPr>
-            <a:spLocks noGrp="1"/>
-          </p:cNvSpPr>
-          <p:nvPr>
-            <p:ph type="body" idx="1"/>
-          </p:nvPr>
-        </p:nvSpPr>
-        <p:spPr/>
-        <p:txBody>
-          <a:bodyPr>
-            <a:normAutofit/>
-          </a:bodyPr>
-          <a:lstStyle/>
-          <a:p>
-            <a:endParaRPr lang="de-DE" dirty="0"/>
-          </a:p>
-        </p:txBody>
-      </p:sp>
-      <p:sp>
-        <p:nvSpPr>
-          <p:cNvPr id="4" name="Foliennummernplatzhalter 3"/>
-          <p:cNvSpPr>
-            <a:spLocks noGrp="1"/>
-          </p:cNvSpPr>
-          <p:nvPr>
-            <p:ph type="sldNum" sz="quarter" idx="10"/>
-          </p:nvPr>
-        </p:nvSpPr>
-        <p:spPr/>
-        <p:txBody>
-          <a:bodyPr/>
-          <a:lstStyle/>
-          <a:p>
-            <a:fld id="{150BA478-331B-4C41-B0D5-A69E59A4437F}" type="slidenum">
-              <a:rPr lang="de-DE" smtClean="0"/>
-              <a:pPr/>
-              <a:t>35</a:t>
-            </a:fld>
-            <a:endParaRPr lang="de-DE" dirty="0"/>
-          </a:p>
-        </p:txBody>
-      </p:sp>
-    </p:spTree>
-    <p:extLst>
-      <p:ext uri="{BB962C8B-B14F-4D97-AF65-F5344CB8AC3E}">
-        <p14:creationId xmlns="" xmlns:p14="http://schemas.microsoft.com/office/powerpoint/2010/main" val="1883132698"/>
+        <p14:creationId xmlns:p14="http://schemas.microsoft.com/office/powerpoint/2010/main" xmlns="" val="1883132698"/>
       </p:ext>
     </p:extLst>
   </p:cSld>
@@ -3227,7 +3139,7 @@
     </p:spTree>
     <p:extLst>
       <p:ext uri="{BB962C8B-B14F-4D97-AF65-F5344CB8AC3E}">
-        <p14:creationId xmlns="" xmlns:p14="http://schemas.microsoft.com/office/powerpoint/2010/main" val="745957084"/>
+        <p14:creationId xmlns:p14="http://schemas.microsoft.com/office/powerpoint/2010/main" xmlns="" val="745957084"/>
       </p:ext>
     </p:extLst>
   </p:cSld>
@@ -3314,7 +3226,7 @@
     </p:spTree>
     <p:extLst>
       <p:ext uri="{BB962C8B-B14F-4D97-AF65-F5344CB8AC3E}">
-        <p14:creationId xmlns="" xmlns:p14="http://schemas.microsoft.com/office/powerpoint/2010/main" val="3920226349"/>
+        <p14:creationId xmlns:p14="http://schemas.microsoft.com/office/powerpoint/2010/main" xmlns="" val="3920226349"/>
       </p:ext>
     </p:extLst>
   </p:cSld>
@@ -3401,7 +3313,7 @@
     </p:spTree>
     <p:extLst>
       <p:ext uri="{BB962C8B-B14F-4D97-AF65-F5344CB8AC3E}">
-        <p14:creationId xmlns="" xmlns:p14="http://schemas.microsoft.com/office/powerpoint/2010/main" val="404239667"/>
+        <p14:creationId xmlns:p14="http://schemas.microsoft.com/office/powerpoint/2010/main" xmlns="" val="404239667"/>
       </p:ext>
     </p:extLst>
   </p:cSld>
@@ -3488,7 +3400,7 @@
     </p:spTree>
     <p:extLst>
       <p:ext uri="{BB962C8B-B14F-4D97-AF65-F5344CB8AC3E}">
-        <p14:creationId xmlns="" xmlns:p14="http://schemas.microsoft.com/office/powerpoint/2010/main" val="1883132698"/>
+        <p14:creationId xmlns:p14="http://schemas.microsoft.com/office/powerpoint/2010/main" xmlns="" val="1883132698"/>
       </p:ext>
     </p:extLst>
   </p:cSld>
@@ -3575,7 +3487,7 @@
     </p:spTree>
     <p:extLst>
       <p:ext uri="{BB962C8B-B14F-4D97-AF65-F5344CB8AC3E}">
-        <p14:creationId xmlns="" xmlns:p14="http://schemas.microsoft.com/office/powerpoint/2010/main" val="1883132698"/>
+        <p14:creationId xmlns:p14="http://schemas.microsoft.com/office/powerpoint/2010/main" xmlns="" val="1883132698"/>
       </p:ext>
     </p:extLst>
   </p:cSld>
@@ -3662,7 +3574,7 @@
     </p:spTree>
     <p:extLst>
       <p:ext uri="{BB962C8B-B14F-4D97-AF65-F5344CB8AC3E}">
-        <p14:creationId xmlns="" xmlns:p14="http://schemas.microsoft.com/office/powerpoint/2010/main" val="1883132698"/>
+        <p14:creationId xmlns:p14="http://schemas.microsoft.com/office/powerpoint/2010/main" xmlns="" val="1883132698"/>
       </p:ext>
     </p:extLst>
   </p:cSld>
@@ -3701,7 +3613,7 @@
           <a:blip r:embed="rId2">
             <a:extLst>
               <a:ext uri="{28A0092B-C50C-407E-A947-70E740481C1C}">
-                <a14:useLocalDpi xmlns="" xmlns:a14="http://schemas.microsoft.com/office/drawing/2010/main" val="0"/>
+                <a14:useLocalDpi xmlns:a14="http://schemas.microsoft.com/office/drawing/2010/main" xmlns="" val="0"/>
               </a:ext>
             </a:extLst>
           </a:blip>
@@ -4015,7 +3927,7 @@
           <a:blip r:embed="rId3">
             <a:extLst>
               <a:ext uri="{28A0092B-C50C-407E-A947-70E740481C1C}">
-                <a14:useLocalDpi xmlns="" xmlns:a14="http://schemas.microsoft.com/office/drawing/2010/main" val="0"/>
+                <a14:useLocalDpi xmlns:a14="http://schemas.microsoft.com/office/drawing/2010/main" xmlns="" val="0"/>
               </a:ext>
             </a:extLst>
           </a:blip>
@@ -4035,7 +3947,7 @@
           <a:noFill/>
           <a:extLst>
             <a:ext uri="{909E8E84-426E-40DD-AFC4-6F175D3DCCD1}">
-              <a14:hiddenFill xmlns="" xmlns:a14="http://schemas.microsoft.com/office/drawing/2010/main">
+              <a14:hiddenFill xmlns:a14="http://schemas.microsoft.com/office/drawing/2010/main" xmlns="">
                 <a:solidFill>
                   <a:srgbClr val="FFFFFF"/>
                 </a:solidFill>
@@ -4047,7 +3959,7 @@
     </p:spTree>
     <p:extLst>
       <p:ext uri="{BB962C8B-B14F-4D97-AF65-F5344CB8AC3E}">
-        <p14:creationId xmlns="" xmlns:p14="http://schemas.microsoft.com/office/powerpoint/2010/main" val="2032434000"/>
+        <p14:creationId xmlns:p14="http://schemas.microsoft.com/office/powerpoint/2010/main" xmlns="" val="2032434000"/>
       </p:ext>
     </p:extLst>
   </p:cSld>
@@ -4093,7 +4005,7 @@
           <a:blip r:embed="rId2">
             <a:extLst>
               <a:ext uri="{28A0092B-C50C-407E-A947-70E740481C1C}">
-                <a14:useLocalDpi xmlns="" xmlns:a14="http://schemas.microsoft.com/office/drawing/2010/main" val="0"/>
+                <a14:useLocalDpi xmlns:a14="http://schemas.microsoft.com/office/drawing/2010/main" xmlns="" val="0"/>
               </a:ext>
             </a:extLst>
           </a:blip>
@@ -4389,7 +4301,7 @@
           <a:blip r:embed="rId3">
             <a:extLst>
               <a:ext uri="{28A0092B-C50C-407E-A947-70E740481C1C}">
-                <a14:useLocalDpi xmlns="" xmlns:a14="http://schemas.microsoft.com/office/drawing/2010/main" val="0"/>
+                <a14:useLocalDpi xmlns:a14="http://schemas.microsoft.com/office/drawing/2010/main" xmlns="" val="0"/>
               </a:ext>
             </a:extLst>
           </a:blip>
@@ -4409,7 +4321,7 @@
           <a:noFill/>
           <a:extLst>
             <a:ext uri="{909E8E84-426E-40DD-AFC4-6F175D3DCCD1}">
-              <a14:hiddenFill xmlns="" xmlns:a14="http://schemas.microsoft.com/office/drawing/2010/main">
+              <a14:hiddenFill xmlns:a14="http://schemas.microsoft.com/office/drawing/2010/main" xmlns="">
                 <a:solidFill>
                   <a:srgbClr val="FFFFFF"/>
                 </a:solidFill>
@@ -4421,7 +4333,7 @@
     </p:spTree>
     <p:extLst>
       <p:ext uri="{BB962C8B-B14F-4D97-AF65-F5344CB8AC3E}">
-        <p14:creationId xmlns="" xmlns:p14="http://schemas.microsoft.com/office/powerpoint/2010/main" val="707728385"/>
+        <p14:creationId xmlns:p14="http://schemas.microsoft.com/office/powerpoint/2010/main" xmlns="" val="707728385"/>
       </p:ext>
     </p:extLst>
   </p:cSld>
@@ -4437,7 +4349,7 @@
   </p:timing>
   <p:extLst mod="1">
     <p:ext uri="{DCECCB84-F9BA-43D5-87BE-67443E8EF086}">
-      <p15:sldGuideLst xmlns:p15="http://schemas.microsoft.com/office/powerpoint/2012/main" xmlns="">
+      <p15:sldGuideLst xmlns="" xmlns:p15="http://schemas.microsoft.com/office/powerpoint/2012/main">
         <p15:guide id="1" orient="horz" pos="1221">
           <p15:clr>
             <a:srgbClr val="C35EA4"/>
@@ -4478,7 +4390,7 @@
           <a:blip r:embed="rId2">
             <a:extLst>
               <a:ext uri="{28A0092B-C50C-407E-A947-70E740481C1C}">
-                <a14:useLocalDpi xmlns="" xmlns:a14="http://schemas.microsoft.com/office/drawing/2010/main" val="0"/>
+                <a14:useLocalDpi xmlns:a14="http://schemas.microsoft.com/office/drawing/2010/main" xmlns="" val="0"/>
               </a:ext>
             </a:extLst>
           </a:blip>
@@ -4729,7 +4641,7 @@
           <a:blip r:embed="rId3">
             <a:extLst>
               <a:ext uri="{28A0092B-C50C-407E-A947-70E740481C1C}">
-                <a14:useLocalDpi xmlns="" xmlns:a14="http://schemas.microsoft.com/office/drawing/2010/main" val="0"/>
+                <a14:useLocalDpi xmlns:a14="http://schemas.microsoft.com/office/drawing/2010/main" xmlns="" val="0"/>
               </a:ext>
             </a:extLst>
           </a:blip>
@@ -4749,7 +4661,7 @@
           <a:noFill/>
           <a:extLst>
             <a:ext uri="{909E8E84-426E-40DD-AFC4-6F175D3DCCD1}">
-              <a14:hiddenFill xmlns="" xmlns:a14="http://schemas.microsoft.com/office/drawing/2010/main">
+              <a14:hiddenFill xmlns:a14="http://schemas.microsoft.com/office/drawing/2010/main" xmlns="">
                 <a:solidFill>
                   <a:srgbClr val="FFFFFF"/>
                 </a:solidFill>
@@ -4761,7 +4673,7 @@
     </p:spTree>
     <p:extLst>
       <p:ext uri="{BB962C8B-B14F-4D97-AF65-F5344CB8AC3E}">
-        <p14:creationId xmlns="" xmlns:p14="http://schemas.microsoft.com/office/powerpoint/2010/main" val="3130113218"/>
+        <p14:creationId xmlns:p14="http://schemas.microsoft.com/office/powerpoint/2010/main" xmlns="" val="3130113218"/>
       </p:ext>
     </p:extLst>
   </p:cSld>
@@ -4770,7 +4682,7 @@
   </p:clrMapOvr>
   <p:extLst mod="1">
     <p:ext uri="{DCECCB84-F9BA-43D5-87BE-67443E8EF086}">
-      <p15:sldGuideLst xmlns:p15="http://schemas.microsoft.com/office/powerpoint/2012/main" xmlns="">
+      <p15:sldGuideLst xmlns="" xmlns:p15="http://schemas.microsoft.com/office/powerpoint/2012/main">
         <p15:guide id="1" orient="horz" pos="1221">
           <p15:clr>
             <a:srgbClr val="C35EA4"/>
@@ -4924,7 +4836,7 @@
     </p:spTree>
     <p:extLst>
       <p:ext uri="{BB962C8B-B14F-4D97-AF65-F5344CB8AC3E}">
-        <p14:creationId xmlns="" xmlns:p14="http://schemas.microsoft.com/office/powerpoint/2010/main" val="2626482632"/>
+        <p14:creationId xmlns:p14="http://schemas.microsoft.com/office/powerpoint/2010/main" xmlns="" val="2626482632"/>
       </p:ext>
     </p:extLst>
   </p:cSld>
@@ -5145,7 +5057,7 @@
     </p:spTree>
     <p:extLst>
       <p:ext uri="{BB962C8B-B14F-4D97-AF65-F5344CB8AC3E}">
-        <p14:creationId xmlns="" xmlns:p14="http://schemas.microsoft.com/office/powerpoint/2010/main" val="3371847988"/>
+        <p14:creationId xmlns:p14="http://schemas.microsoft.com/office/powerpoint/2010/main" xmlns="" val="3371847988"/>
       </p:ext>
     </p:extLst>
   </p:cSld>
@@ -5361,7 +5273,7 @@
     </p:spTree>
     <p:extLst>
       <p:ext uri="{BB962C8B-B14F-4D97-AF65-F5344CB8AC3E}">
-        <p14:creationId xmlns="" xmlns:p14="http://schemas.microsoft.com/office/powerpoint/2010/main" val="4208395069"/>
+        <p14:creationId xmlns:p14="http://schemas.microsoft.com/office/powerpoint/2010/main" xmlns="" val="4208395069"/>
       </p:ext>
     </p:extLst>
   </p:cSld>
@@ -5457,7 +5369,7 @@
     </p:spTree>
     <p:extLst>
       <p:ext uri="{BB962C8B-B14F-4D97-AF65-F5344CB8AC3E}">
-        <p14:creationId xmlns="" xmlns:p14="http://schemas.microsoft.com/office/powerpoint/2010/main" val="2097094422"/>
+        <p14:creationId xmlns:p14="http://schemas.microsoft.com/office/powerpoint/2010/main" xmlns="" val="2097094422"/>
       </p:ext>
     </p:extLst>
   </p:cSld>
@@ -5493,7 +5405,7 @@
           <p:nvPr userDrawn="1">
             <p:extLst>
               <p:ext uri="{D42A27DB-BD31-4B8C-83A1-F6EECF244321}">
-                <p14:modId xmlns="" xmlns:p14="http://schemas.microsoft.com/office/powerpoint/2010/main" val="2766779821"/>
+                <p14:modId xmlns:p14="http://schemas.microsoft.com/office/powerpoint/2010/main" xmlns="" val="2766779821"/>
               </p:ext>
             </p:extLst>
           </p:nvPr>
@@ -5522,7 +5434,7 @@
           <a:blip r:embed="rId4">
             <a:extLst>
               <a:ext uri="{28A0092B-C50C-407E-A947-70E740481C1C}">
-                <a14:useLocalDpi xmlns="" xmlns:a14="http://schemas.microsoft.com/office/drawing/2010/main" val="0"/>
+                <a14:useLocalDpi xmlns:a14="http://schemas.microsoft.com/office/drawing/2010/main" xmlns="" val="0"/>
               </a:ext>
             </a:extLst>
           </a:blip>
@@ -5774,7 +5686,7 @@
     </p:spTree>
     <p:extLst>
       <p:ext uri="{BB962C8B-B14F-4D97-AF65-F5344CB8AC3E}">
-        <p14:creationId xmlns="" xmlns:p14="http://schemas.microsoft.com/office/powerpoint/2010/main" val="2060546820"/>
+        <p14:creationId xmlns:p14="http://schemas.microsoft.com/office/powerpoint/2010/main" xmlns="" val="2060546820"/>
       </p:ext>
     </p:extLst>
   </p:cSld>
@@ -5818,7 +5730,7 @@
           <a:blip r:embed="rId11">
             <a:extLst>
               <a:ext uri="{28A0092B-C50C-407E-A947-70E740481C1C}">
-                <a14:useLocalDpi xmlns="" xmlns:a14="http://schemas.microsoft.com/office/drawing/2010/main" val="0"/>
+                <a14:useLocalDpi xmlns:a14="http://schemas.microsoft.com/office/drawing/2010/main" xmlns="" val="0"/>
               </a:ext>
             </a:extLst>
           </a:blip>
@@ -5838,7 +5750,7 @@
           <a:noFill/>
           <a:extLst>
             <a:ext uri="{909E8E84-426E-40DD-AFC4-6F175D3DCCD1}">
-              <a14:hiddenFill xmlns="" xmlns:a14="http://schemas.microsoft.com/office/drawing/2010/main">
+              <a14:hiddenFill xmlns:a14="http://schemas.microsoft.com/office/drawing/2010/main" xmlns="">
                 <a:solidFill>
                   <a:srgbClr val="FFFFFF"/>
                 </a:solidFill>
@@ -5856,7 +5768,7 @@
           <p:nvPr>
             <p:extLst>
               <p:ext uri="{D42A27DB-BD31-4B8C-83A1-F6EECF244321}">
-                <p14:modId xmlns="" xmlns:p14="http://schemas.microsoft.com/office/powerpoint/2010/main" val="2610759032"/>
+                <p14:modId xmlns:p14="http://schemas.microsoft.com/office/powerpoint/2010/main" xmlns="" val="2610759032"/>
               </p:ext>
             </p:extLst>
           </p:nvPr>
@@ -6727,7 +6639,7 @@
     </p:spTree>
     <p:extLst>
       <p:ext uri="{BB962C8B-B14F-4D97-AF65-F5344CB8AC3E}">
-        <p14:creationId xmlns="" xmlns:p14="http://schemas.microsoft.com/office/powerpoint/2010/main" val="2955847980"/>
+        <p14:creationId xmlns:p14="http://schemas.microsoft.com/office/powerpoint/2010/main" xmlns="" val="2955847980"/>
       </p:ext>
     </p:extLst>
   </p:cSld>
@@ -7046,7 +6958,7 @@
   </p:txStyles>
   <p:extLst mod="1">
     <p:ext uri="{27BBF7A9-308A-43DC-89C8-2F10F3537804}">
-      <p15:sldGuideLst xmlns:p15="http://schemas.microsoft.com/office/powerpoint/2012/main" xmlns="">
+      <p15:sldGuideLst xmlns="" xmlns:p15="http://schemas.microsoft.com/office/powerpoint/2012/main">
         <p15:guide id="1" pos="283">
           <p15:clr>
             <a:srgbClr val="FBAE40"/>
@@ -7190,7 +7102,7 @@
     </p:spTree>
     <p:extLst>
       <p:ext uri="{BB962C8B-B14F-4D97-AF65-F5344CB8AC3E}">
-        <p14:creationId xmlns="" xmlns:p14="http://schemas.microsoft.com/office/powerpoint/2010/main" val="3230101943"/>
+        <p14:creationId xmlns:p14="http://schemas.microsoft.com/office/powerpoint/2010/main" xmlns="" val="3230101943"/>
       </p:ext>
     </p:extLst>
   </p:cSld>
@@ -7399,7 +7311,7 @@
     </p:spTree>
     <p:extLst>
       <p:ext uri="{BB962C8B-B14F-4D97-AF65-F5344CB8AC3E}">
-        <p14:creationId xmlns="" xmlns:p14="http://schemas.microsoft.com/office/powerpoint/2010/main" val="565121571"/>
+        <p14:creationId xmlns:p14="http://schemas.microsoft.com/office/powerpoint/2010/main" xmlns="" val="565121571"/>
       </p:ext>
     </p:extLst>
   </p:cSld>
@@ -7407,7 +7319,7 @@
     <a:masterClrMapping/>
   </p:clrMapOvr>
   <mc:AlternateContent xmlns:mc="http://schemas.openxmlformats.org/markup-compatibility/2006">
-    <mc:Choice xmlns="" xmlns:p14="http://schemas.microsoft.com/office/powerpoint/2010/main" Requires="p14">
+    <mc:Choice xmlns:p14="http://schemas.microsoft.com/office/powerpoint/2010/main" xmlns="" Requires="p14">
       <p:transition p14:dur="10"/>
     </mc:Choice>
     <mc:Fallback>
@@ -8130,7 +8042,7 @@
     </p:spTree>
     <p:extLst>
       <p:ext uri="{BB962C8B-B14F-4D97-AF65-F5344CB8AC3E}">
-        <p14:creationId xmlns="" xmlns:p14="http://schemas.microsoft.com/office/powerpoint/2010/main" val="1329190289"/>
+        <p14:creationId xmlns:p14="http://schemas.microsoft.com/office/powerpoint/2010/main" xmlns="" val="1329190289"/>
       </p:ext>
     </p:extLst>
   </p:cSld>
@@ -8138,7 +8050,7 @@
     <a:masterClrMapping/>
   </p:clrMapOvr>
   <mc:AlternateContent xmlns:mc="http://schemas.openxmlformats.org/markup-compatibility/2006">
-    <mc:Choice xmlns="" xmlns:p14="http://schemas.microsoft.com/office/powerpoint/2010/main" Requires="p14">
+    <mc:Choice xmlns:p14="http://schemas.microsoft.com/office/powerpoint/2010/main" xmlns="" Requires="p14">
       <p:transition p14:dur="10"/>
     </mc:Choice>
     <mc:Fallback>
@@ -8730,7 +8642,7 @@
           <a:blip r:embed="rId8">
             <a:extLst>
               <a:ext uri="{28A0092B-C50C-407E-A947-70E740481C1C}">
-                <a14:useLocalDpi xmlns="" xmlns:a14="http://schemas.microsoft.com/office/drawing/2010/main" val="0"/>
+                <a14:useLocalDpi xmlns:a14="http://schemas.microsoft.com/office/drawing/2010/main" xmlns="" val="0"/>
               </a:ext>
             </a:extLst>
           </a:blip>
@@ -8753,14 +8665,14 @@
           </a:ln>
           <a:extLst>
             <a:ext uri="{909E8E84-426E-40DD-AFC4-6F175D3DCCD1}">
-              <a14:hiddenFill xmlns="" xmlns:a14="http://schemas.microsoft.com/office/drawing/2010/main">
+              <a14:hiddenFill xmlns:a14="http://schemas.microsoft.com/office/drawing/2010/main" xmlns="">
                 <a:solidFill>
                   <a:schemeClr val="accent1"/>
                 </a:solidFill>
               </a14:hiddenFill>
             </a:ext>
             <a:ext uri="{91240B29-F687-4F45-9708-019B960494DF}">
-              <a14:hiddenLine xmlns="" xmlns:a14="http://schemas.microsoft.com/office/drawing/2010/main" w="9525">
+              <a14:hiddenLine xmlns:a14="http://schemas.microsoft.com/office/drawing/2010/main" xmlns="" w="9525">
                 <a:solidFill>
                   <a:schemeClr val="tx1"/>
                 </a:solidFill>
@@ -8775,7 +8687,7 @@
     </p:spTree>
     <p:extLst>
       <p:ext uri="{BB962C8B-B14F-4D97-AF65-F5344CB8AC3E}">
-        <p14:creationId xmlns="" xmlns:p14="http://schemas.microsoft.com/office/powerpoint/2010/main" val="1445465161"/>
+        <p14:creationId xmlns:p14="http://schemas.microsoft.com/office/powerpoint/2010/main" xmlns="" val="1445465161"/>
       </p:ext>
     </p:extLst>
   </p:cSld>
@@ -8783,7 +8695,7 @@
     <a:masterClrMapping/>
   </p:clrMapOvr>
   <mc:AlternateContent xmlns:mc="http://schemas.openxmlformats.org/markup-compatibility/2006">
-    <mc:Choice xmlns="" xmlns:p14="http://schemas.microsoft.com/office/powerpoint/2010/main" Requires="p14">
+    <mc:Choice xmlns:p14="http://schemas.microsoft.com/office/powerpoint/2010/main" xmlns="" Requires="p14">
       <p:transition p14:dur="10"/>
     </mc:Choice>
     <mc:Fallback>
@@ -9000,7 +8912,7 @@
           <a:blip r:embed="rId4">
             <a:extLst>
               <a:ext uri="{28A0092B-C50C-407E-A947-70E740481C1C}">
-                <a14:useLocalDpi xmlns="" xmlns:a14="http://schemas.microsoft.com/office/drawing/2010/main" val="0"/>
+                <a14:useLocalDpi xmlns:a14="http://schemas.microsoft.com/office/drawing/2010/main" xmlns="" val="0"/>
               </a:ext>
             </a:extLst>
           </a:blip>
@@ -9023,14 +8935,14 @@
           </a:ln>
           <a:extLst>
             <a:ext uri="{909E8E84-426E-40DD-AFC4-6F175D3DCCD1}">
-              <a14:hiddenFill xmlns="" xmlns:a14="http://schemas.microsoft.com/office/drawing/2010/main">
+              <a14:hiddenFill xmlns:a14="http://schemas.microsoft.com/office/drawing/2010/main" xmlns="">
                 <a:solidFill>
                   <a:schemeClr val="accent1"/>
                 </a:solidFill>
               </a14:hiddenFill>
             </a:ext>
             <a:ext uri="{91240B29-F687-4F45-9708-019B960494DF}">
-              <a14:hiddenLine xmlns="" xmlns:a14="http://schemas.microsoft.com/office/drawing/2010/main" w="9525">
+              <a14:hiddenLine xmlns:a14="http://schemas.microsoft.com/office/drawing/2010/main" xmlns="" w="9525">
                 <a:solidFill>
                   <a:schemeClr val="tx1"/>
                 </a:solidFill>
@@ -9054,7 +8966,7 @@
           <a:blip r:embed="rId5">
             <a:extLst>
               <a:ext uri="{28A0092B-C50C-407E-A947-70E740481C1C}">
-                <a14:useLocalDpi xmlns="" xmlns:a14="http://schemas.microsoft.com/office/drawing/2010/main" val="0"/>
+                <a14:useLocalDpi xmlns:a14="http://schemas.microsoft.com/office/drawing/2010/main" xmlns="" val="0"/>
               </a:ext>
             </a:extLst>
           </a:blip>
@@ -9077,14 +8989,14 @@
           </a:ln>
           <a:extLst>
             <a:ext uri="{909E8E84-426E-40DD-AFC4-6F175D3DCCD1}">
-              <a14:hiddenFill xmlns="" xmlns:a14="http://schemas.microsoft.com/office/drawing/2010/main">
+              <a14:hiddenFill xmlns:a14="http://schemas.microsoft.com/office/drawing/2010/main" xmlns="">
                 <a:solidFill>
                   <a:schemeClr val="accent1"/>
                 </a:solidFill>
               </a14:hiddenFill>
             </a:ext>
             <a:ext uri="{91240B29-F687-4F45-9708-019B960494DF}">
-              <a14:hiddenLine xmlns="" xmlns:a14="http://schemas.microsoft.com/office/drawing/2010/main" w="9525">
+              <a14:hiddenLine xmlns:a14="http://schemas.microsoft.com/office/drawing/2010/main" xmlns="" w="9525">
                 <a:solidFill>
                   <a:schemeClr val="tx1"/>
                 </a:solidFill>
@@ -9415,7 +9327,7 @@
     </p:spTree>
     <p:extLst>
       <p:ext uri="{BB962C8B-B14F-4D97-AF65-F5344CB8AC3E}">
-        <p14:creationId xmlns="" xmlns:p14="http://schemas.microsoft.com/office/powerpoint/2010/main" val="3166790887"/>
+        <p14:creationId xmlns:p14="http://schemas.microsoft.com/office/powerpoint/2010/main" xmlns="" val="3166790887"/>
       </p:ext>
     </p:extLst>
   </p:cSld>
@@ -9423,7 +9335,7 @@
     <a:masterClrMapping/>
   </p:clrMapOvr>
   <mc:AlternateContent xmlns:mc="http://schemas.openxmlformats.org/markup-compatibility/2006">
-    <mc:Choice xmlns="" xmlns:p14="http://schemas.microsoft.com/office/powerpoint/2010/main" Requires="p14">
+    <mc:Choice xmlns:p14="http://schemas.microsoft.com/office/powerpoint/2010/main" xmlns="" Requires="p14">
       <p:transition p14:dur="10"/>
     </mc:Choice>
     <mc:Fallback>
@@ -9597,7 +9509,7 @@
           <a:blip r:embed="rId4">
             <a:extLst>
               <a:ext uri="{28A0092B-C50C-407E-A947-70E740481C1C}">
-                <a14:useLocalDpi xmlns="" xmlns:a14="http://schemas.microsoft.com/office/drawing/2010/main" val="0"/>
+                <a14:useLocalDpi xmlns:a14="http://schemas.microsoft.com/office/drawing/2010/main" xmlns="" val="0"/>
               </a:ext>
             </a:extLst>
           </a:blip>
@@ -9620,14 +9532,14 @@
           </a:ln>
           <a:extLst>
             <a:ext uri="{909E8E84-426E-40DD-AFC4-6F175D3DCCD1}">
-              <a14:hiddenFill xmlns="" xmlns:a14="http://schemas.microsoft.com/office/drawing/2010/main">
+              <a14:hiddenFill xmlns:a14="http://schemas.microsoft.com/office/drawing/2010/main" xmlns="">
                 <a:solidFill>
                   <a:schemeClr val="accent1"/>
                 </a:solidFill>
               </a14:hiddenFill>
             </a:ext>
             <a:ext uri="{91240B29-F687-4F45-9708-019B960494DF}">
-              <a14:hiddenLine xmlns="" xmlns:a14="http://schemas.microsoft.com/office/drawing/2010/main" w="9525">
+              <a14:hiddenLine xmlns:a14="http://schemas.microsoft.com/office/drawing/2010/main" xmlns="" w="9525">
                 <a:solidFill>
                   <a:schemeClr val="tx1"/>
                 </a:solidFill>
@@ -9642,7 +9554,7 @@
     </p:spTree>
     <p:extLst>
       <p:ext uri="{BB962C8B-B14F-4D97-AF65-F5344CB8AC3E}">
-        <p14:creationId xmlns="" xmlns:p14="http://schemas.microsoft.com/office/powerpoint/2010/main" val="2519267293"/>
+        <p14:creationId xmlns:p14="http://schemas.microsoft.com/office/powerpoint/2010/main" xmlns="" val="2519267293"/>
       </p:ext>
     </p:extLst>
   </p:cSld>
@@ -9650,7 +9562,7 @@
     <a:masterClrMapping/>
   </p:clrMapOvr>
   <mc:AlternateContent xmlns:mc="http://schemas.openxmlformats.org/markup-compatibility/2006">
-    <mc:Choice xmlns="" xmlns:p14="http://schemas.microsoft.com/office/powerpoint/2010/main" Requires="p14">
+    <mc:Choice xmlns:p14="http://schemas.microsoft.com/office/powerpoint/2010/main" xmlns="" Requires="p14">
       <p:transition p14:dur="10"/>
     </mc:Choice>
     <mc:Fallback>
@@ -9834,7 +9746,7 @@
           <a:blip r:embed="rId4">
             <a:extLst>
               <a:ext uri="{28A0092B-C50C-407E-A947-70E740481C1C}">
-                <a14:useLocalDpi xmlns="" xmlns:a14="http://schemas.microsoft.com/office/drawing/2010/main" val="0"/>
+                <a14:useLocalDpi xmlns:a14="http://schemas.microsoft.com/office/drawing/2010/main" xmlns="" val="0"/>
               </a:ext>
             </a:extLst>
           </a:blip>
@@ -9857,14 +9769,14 @@
           </a:ln>
           <a:extLst>
             <a:ext uri="{909E8E84-426E-40DD-AFC4-6F175D3DCCD1}">
-              <a14:hiddenFill xmlns="" xmlns:a14="http://schemas.microsoft.com/office/drawing/2010/main">
+              <a14:hiddenFill xmlns:a14="http://schemas.microsoft.com/office/drawing/2010/main" xmlns="">
                 <a:solidFill>
                   <a:schemeClr val="accent1"/>
                 </a:solidFill>
               </a14:hiddenFill>
             </a:ext>
             <a:ext uri="{91240B29-F687-4F45-9708-019B960494DF}">
-              <a14:hiddenLine xmlns="" xmlns:a14="http://schemas.microsoft.com/office/drawing/2010/main" w="9525">
+              <a14:hiddenLine xmlns:a14="http://schemas.microsoft.com/office/drawing/2010/main" xmlns="" w="9525">
                 <a:solidFill>
                   <a:schemeClr val="tx1"/>
                 </a:solidFill>
@@ -9879,7 +9791,7 @@
     </p:spTree>
     <p:extLst>
       <p:ext uri="{BB962C8B-B14F-4D97-AF65-F5344CB8AC3E}">
-        <p14:creationId xmlns="" xmlns:p14="http://schemas.microsoft.com/office/powerpoint/2010/main" val="245669067"/>
+        <p14:creationId xmlns:p14="http://schemas.microsoft.com/office/powerpoint/2010/main" xmlns="" val="245669067"/>
       </p:ext>
     </p:extLst>
   </p:cSld>
@@ -9887,7 +9799,7 @@
     <a:masterClrMapping/>
   </p:clrMapOvr>
   <mc:AlternateContent xmlns:mc="http://schemas.openxmlformats.org/markup-compatibility/2006">
-    <mc:Choice xmlns="" xmlns:p14="http://schemas.microsoft.com/office/powerpoint/2010/main" Requires="p14">
+    <mc:Choice xmlns:p14="http://schemas.microsoft.com/office/powerpoint/2010/main" xmlns="" Requires="p14">
       <p:transition p14:dur="10"/>
     </mc:Choice>
     <mc:Fallback>
@@ -10116,7 +10028,7 @@
           <a:blip r:embed="rId5">
             <a:extLst>
               <a:ext uri="{28A0092B-C50C-407E-A947-70E740481C1C}">
-                <a14:useLocalDpi xmlns="" xmlns:a14="http://schemas.microsoft.com/office/drawing/2010/main" val="0"/>
+                <a14:useLocalDpi xmlns:a14="http://schemas.microsoft.com/office/drawing/2010/main" xmlns="" val="0"/>
               </a:ext>
             </a:extLst>
           </a:blip>
@@ -10139,14 +10051,14 @@
           </a:ln>
           <a:extLst>
             <a:ext uri="{909E8E84-426E-40DD-AFC4-6F175D3DCCD1}">
-              <a14:hiddenFill xmlns="" xmlns:a14="http://schemas.microsoft.com/office/drawing/2010/main">
+              <a14:hiddenFill xmlns:a14="http://schemas.microsoft.com/office/drawing/2010/main" xmlns="">
                 <a:solidFill>
                   <a:schemeClr val="accent1"/>
                 </a:solidFill>
               </a14:hiddenFill>
             </a:ext>
             <a:ext uri="{91240B29-F687-4F45-9708-019B960494DF}">
-              <a14:hiddenLine xmlns="" xmlns:a14="http://schemas.microsoft.com/office/drawing/2010/main" w="9525">
+              <a14:hiddenLine xmlns:a14="http://schemas.microsoft.com/office/drawing/2010/main" xmlns="" w="9525">
                 <a:solidFill>
                   <a:schemeClr val="tx1"/>
                 </a:solidFill>
@@ -10161,7 +10073,7 @@
     </p:spTree>
     <p:extLst>
       <p:ext uri="{BB962C8B-B14F-4D97-AF65-F5344CB8AC3E}">
-        <p14:creationId xmlns="" xmlns:p14="http://schemas.microsoft.com/office/powerpoint/2010/main" val="477170418"/>
+        <p14:creationId xmlns:p14="http://schemas.microsoft.com/office/powerpoint/2010/main" xmlns="" val="477170418"/>
       </p:ext>
     </p:extLst>
   </p:cSld>
@@ -10169,7 +10081,7 @@
     <a:masterClrMapping/>
   </p:clrMapOvr>
   <mc:AlternateContent xmlns:mc="http://schemas.openxmlformats.org/markup-compatibility/2006">
-    <mc:Choice xmlns="" xmlns:p14="http://schemas.microsoft.com/office/powerpoint/2010/main" Requires="p14">
+    <mc:Choice xmlns:p14="http://schemas.microsoft.com/office/powerpoint/2010/main" xmlns="" Requires="p14">
       <p:transition p14:dur="10"/>
     </mc:Choice>
     <mc:Fallback>
@@ -10348,7 +10260,7 @@
           <a:blip r:embed="rId5">
             <a:extLst>
               <a:ext uri="{28A0092B-C50C-407E-A947-70E740481C1C}">
-                <a14:useLocalDpi xmlns="" xmlns:a14="http://schemas.microsoft.com/office/drawing/2010/main" val="0"/>
+                <a14:useLocalDpi xmlns:a14="http://schemas.microsoft.com/office/drawing/2010/main" xmlns="" val="0"/>
               </a:ext>
             </a:extLst>
           </a:blip>
@@ -10371,14 +10283,14 @@
           </a:ln>
           <a:extLst>
             <a:ext uri="{909E8E84-426E-40DD-AFC4-6F175D3DCCD1}">
-              <a14:hiddenFill xmlns="" xmlns:a14="http://schemas.microsoft.com/office/drawing/2010/main">
+              <a14:hiddenFill xmlns:a14="http://schemas.microsoft.com/office/drawing/2010/main" xmlns="">
                 <a:solidFill>
                   <a:schemeClr val="accent1"/>
                 </a:solidFill>
               </a14:hiddenFill>
             </a:ext>
             <a:ext uri="{91240B29-F687-4F45-9708-019B960494DF}">
-              <a14:hiddenLine xmlns="" xmlns:a14="http://schemas.microsoft.com/office/drawing/2010/main" w="9525">
+              <a14:hiddenLine xmlns:a14="http://schemas.microsoft.com/office/drawing/2010/main" xmlns="" w="9525">
                 <a:solidFill>
                   <a:schemeClr val="tx1"/>
                 </a:solidFill>
@@ -10393,7 +10305,7 @@
     </p:spTree>
     <p:extLst>
       <p:ext uri="{BB962C8B-B14F-4D97-AF65-F5344CB8AC3E}">
-        <p14:creationId xmlns="" xmlns:p14="http://schemas.microsoft.com/office/powerpoint/2010/main" val="2865102593"/>
+        <p14:creationId xmlns:p14="http://schemas.microsoft.com/office/powerpoint/2010/main" xmlns="" val="2865102593"/>
       </p:ext>
     </p:extLst>
   </p:cSld>
@@ -10401,7 +10313,7 @@
     <a:masterClrMapping/>
   </p:clrMapOvr>
   <mc:AlternateContent xmlns:mc="http://schemas.openxmlformats.org/markup-compatibility/2006">
-    <mc:Choice xmlns="" xmlns:p14="http://schemas.microsoft.com/office/powerpoint/2010/main" Requires="p14">
+    <mc:Choice xmlns:p14="http://schemas.microsoft.com/office/powerpoint/2010/main" xmlns="" Requires="p14">
       <p:transition p14:dur="10"/>
     </mc:Choice>
     <mc:Fallback>
@@ -10577,7 +10489,7 @@
           <a:blip r:embed="rId4">
             <a:extLst>
               <a:ext uri="{28A0092B-C50C-407E-A947-70E740481C1C}">
-                <a14:useLocalDpi xmlns="" xmlns:a14="http://schemas.microsoft.com/office/drawing/2010/main" val="0"/>
+                <a14:useLocalDpi xmlns:a14="http://schemas.microsoft.com/office/drawing/2010/main" xmlns="" val="0"/>
               </a:ext>
             </a:extLst>
           </a:blip>
@@ -10600,14 +10512,14 @@
           </a:ln>
           <a:extLst>
             <a:ext uri="{909E8E84-426E-40DD-AFC4-6F175D3DCCD1}">
-              <a14:hiddenFill xmlns="" xmlns:a14="http://schemas.microsoft.com/office/drawing/2010/main">
+              <a14:hiddenFill xmlns:a14="http://schemas.microsoft.com/office/drawing/2010/main" xmlns="">
                 <a:solidFill>
                   <a:schemeClr val="accent1"/>
                 </a:solidFill>
               </a14:hiddenFill>
             </a:ext>
             <a:ext uri="{91240B29-F687-4F45-9708-019B960494DF}">
-              <a14:hiddenLine xmlns="" xmlns:a14="http://schemas.microsoft.com/office/drawing/2010/main" w="9525">
+              <a14:hiddenLine xmlns:a14="http://schemas.microsoft.com/office/drawing/2010/main" xmlns="" w="9525">
                 <a:solidFill>
                   <a:schemeClr val="tx1"/>
                 </a:solidFill>
@@ -10622,7 +10534,7 @@
     </p:spTree>
     <p:extLst>
       <p:ext uri="{BB962C8B-B14F-4D97-AF65-F5344CB8AC3E}">
-        <p14:creationId xmlns="" xmlns:p14="http://schemas.microsoft.com/office/powerpoint/2010/main" val="306169062"/>
+        <p14:creationId xmlns:p14="http://schemas.microsoft.com/office/powerpoint/2010/main" xmlns="" val="306169062"/>
       </p:ext>
     </p:extLst>
   </p:cSld>
@@ -10630,7 +10542,7 @@
     <a:masterClrMapping/>
   </p:clrMapOvr>
   <mc:AlternateContent xmlns:mc="http://schemas.openxmlformats.org/markup-compatibility/2006">
-    <mc:Choice xmlns="" xmlns:p14="http://schemas.microsoft.com/office/powerpoint/2010/main" Requires="p14">
+    <mc:Choice xmlns:p14="http://schemas.microsoft.com/office/powerpoint/2010/main" xmlns="" Requires="p14">
       <p:transition p14:dur="10"/>
     </mc:Choice>
     <mc:Fallback>
@@ -10812,7 +10724,7 @@
           <a:blip r:embed="rId3">
             <a:extLst>
               <a:ext uri="{28A0092B-C50C-407E-A947-70E740481C1C}">
-                <a14:useLocalDpi xmlns="" xmlns:a14="http://schemas.microsoft.com/office/drawing/2010/main" val="0"/>
+                <a14:useLocalDpi xmlns:a14="http://schemas.microsoft.com/office/drawing/2010/main" xmlns="" val="0"/>
               </a:ext>
             </a:extLst>
           </a:blip>
@@ -10835,14 +10747,14 @@
           </a:ln>
           <a:extLst>
             <a:ext uri="{909E8E84-426E-40DD-AFC4-6F175D3DCCD1}">
-              <a14:hiddenFill xmlns="" xmlns:a14="http://schemas.microsoft.com/office/drawing/2010/main">
+              <a14:hiddenFill xmlns:a14="http://schemas.microsoft.com/office/drawing/2010/main" xmlns="">
                 <a:solidFill>
                   <a:schemeClr val="accent1"/>
                 </a:solidFill>
               </a14:hiddenFill>
             </a:ext>
             <a:ext uri="{91240B29-F687-4F45-9708-019B960494DF}">
-              <a14:hiddenLine xmlns="" xmlns:a14="http://schemas.microsoft.com/office/drawing/2010/main" w="9525">
+              <a14:hiddenLine xmlns:a14="http://schemas.microsoft.com/office/drawing/2010/main" xmlns="" w="9525">
                 <a:solidFill>
                   <a:schemeClr val="tx1"/>
                 </a:solidFill>
@@ -10857,7 +10769,7 @@
     </p:spTree>
     <p:extLst>
       <p:ext uri="{BB962C8B-B14F-4D97-AF65-F5344CB8AC3E}">
-        <p14:creationId xmlns="" xmlns:p14="http://schemas.microsoft.com/office/powerpoint/2010/main" val="1315379794"/>
+        <p14:creationId xmlns:p14="http://schemas.microsoft.com/office/powerpoint/2010/main" xmlns="" val="1315379794"/>
       </p:ext>
     </p:extLst>
   </p:cSld>
@@ -10865,7 +10777,7 @@
     <a:masterClrMapping/>
   </p:clrMapOvr>
   <mc:AlternateContent xmlns:mc="http://schemas.openxmlformats.org/markup-compatibility/2006">
-    <mc:Choice xmlns="" xmlns:p14="http://schemas.microsoft.com/office/powerpoint/2010/main" Requires="p14">
+    <mc:Choice xmlns:p14="http://schemas.microsoft.com/office/powerpoint/2010/main" xmlns="" Requires="p14">
       <p:transition p14:dur="10"/>
     </mc:Choice>
     <mc:Fallback>
@@ -11121,7 +11033,7 @@
     </p:spTree>
     <p:extLst>
       <p:ext uri="{BB962C8B-B14F-4D97-AF65-F5344CB8AC3E}">
-        <p14:creationId xmlns="" xmlns:p14="http://schemas.microsoft.com/office/powerpoint/2010/main" val="2788988127"/>
+        <p14:creationId xmlns:p14="http://schemas.microsoft.com/office/powerpoint/2010/main" xmlns="" val="2788988127"/>
       </p:ext>
     </p:extLst>
   </p:cSld>
@@ -11129,7 +11041,7 @@
     <a:masterClrMapping/>
   </p:clrMapOvr>
   <mc:AlternateContent xmlns:mc="http://schemas.openxmlformats.org/markup-compatibility/2006">
-    <mc:Choice xmlns="" xmlns:p14="http://schemas.microsoft.com/office/powerpoint/2010/main" Requires="p14">
+    <mc:Choice xmlns:p14="http://schemas.microsoft.com/office/powerpoint/2010/main" xmlns="" Requires="p14">
       <p:transition p14:dur="10"/>
     </mc:Choice>
     <mc:Fallback>
@@ -12190,7 +12102,7 @@
     </p:spTree>
     <p:extLst>
       <p:ext uri="{BB962C8B-B14F-4D97-AF65-F5344CB8AC3E}">
-        <p14:creationId xmlns="" xmlns:p14="http://schemas.microsoft.com/office/powerpoint/2010/main" val="1765496199"/>
+        <p14:creationId xmlns:p14="http://schemas.microsoft.com/office/powerpoint/2010/main" xmlns="" val="1765496199"/>
       </p:ext>
     </p:extLst>
   </p:cSld>
@@ -12198,7 +12110,7 @@
     <a:masterClrMapping/>
   </p:clrMapOvr>
   <mc:AlternateContent xmlns:mc="http://schemas.openxmlformats.org/markup-compatibility/2006">
-    <mc:Choice xmlns="" xmlns:p14="http://schemas.microsoft.com/office/powerpoint/2010/main" Requires="p14">
+    <mc:Choice xmlns:p14="http://schemas.microsoft.com/office/powerpoint/2010/main" xmlns="" Requires="p14">
       <p:transition p14:dur="10"/>
     </mc:Choice>
     <mc:Fallback>
@@ -12716,7 +12628,7 @@
     </p:spTree>
     <p:extLst>
       <p:ext uri="{BB962C8B-B14F-4D97-AF65-F5344CB8AC3E}">
-        <p14:creationId xmlns="" xmlns:p14="http://schemas.microsoft.com/office/powerpoint/2010/main" val="1424189538"/>
+        <p14:creationId xmlns:p14="http://schemas.microsoft.com/office/powerpoint/2010/main" xmlns="" val="1424189538"/>
       </p:ext>
     </p:extLst>
   </p:cSld>
@@ -12724,7 +12636,7 @@
     <a:masterClrMapping/>
   </p:clrMapOvr>
   <mc:AlternateContent xmlns:mc="http://schemas.openxmlformats.org/markup-compatibility/2006">
-    <mc:Choice xmlns="" xmlns:p14="http://schemas.microsoft.com/office/powerpoint/2010/main" Requires="p14">
+    <mc:Choice xmlns:p14="http://schemas.microsoft.com/office/powerpoint/2010/main" xmlns="" Requires="p14">
       <p:transition p14:dur="10"/>
     </mc:Choice>
     <mc:Fallback>
@@ -13183,7 +13095,7 @@
     </p:spTree>
     <p:extLst>
       <p:ext uri="{BB962C8B-B14F-4D97-AF65-F5344CB8AC3E}">
-        <p14:creationId xmlns="" xmlns:p14="http://schemas.microsoft.com/office/powerpoint/2010/main" val="1336546276"/>
+        <p14:creationId xmlns:p14="http://schemas.microsoft.com/office/powerpoint/2010/main" xmlns="" val="1336546276"/>
       </p:ext>
     </p:extLst>
   </p:cSld>
@@ -13191,7 +13103,7 @@
     <a:masterClrMapping/>
   </p:clrMapOvr>
   <mc:AlternateContent xmlns:mc="http://schemas.openxmlformats.org/markup-compatibility/2006">
-    <mc:Choice xmlns="" xmlns:p14="http://schemas.microsoft.com/office/powerpoint/2010/main" Requires="p14">
+    <mc:Choice xmlns:p14="http://schemas.microsoft.com/office/powerpoint/2010/main" xmlns="" Requires="p14">
       <p:transition p14:dur="10"/>
     </mc:Choice>
     <mc:Fallback>
@@ -13338,7 +13250,7 @@
     </p:spTree>
     <p:extLst>
       <p:ext uri="{BB962C8B-B14F-4D97-AF65-F5344CB8AC3E}">
-        <p14:creationId xmlns="" xmlns:p14="http://schemas.microsoft.com/office/powerpoint/2010/main" val="2042540814"/>
+        <p14:creationId xmlns:p14="http://schemas.microsoft.com/office/powerpoint/2010/main" xmlns="" val="2042540814"/>
       </p:ext>
     </p:extLst>
   </p:cSld>
@@ -13346,7 +13258,7 @@
     <a:masterClrMapping/>
   </p:clrMapOvr>
   <mc:AlternateContent xmlns:mc="http://schemas.openxmlformats.org/markup-compatibility/2006">
-    <mc:Choice xmlns="" xmlns:p14="http://schemas.microsoft.com/office/powerpoint/2010/main" Requires="p14">
+    <mc:Choice xmlns:p14="http://schemas.microsoft.com/office/powerpoint/2010/main" xmlns="" Requires="p14">
       <p:transition p14:dur="10"/>
     </mc:Choice>
     <mc:Fallback>
@@ -13555,7 +13467,7 @@
     </p:spTree>
     <p:extLst>
       <p:ext uri="{BB962C8B-B14F-4D97-AF65-F5344CB8AC3E}">
-        <p14:creationId xmlns="" xmlns:p14="http://schemas.microsoft.com/office/powerpoint/2010/main" val="1825348506"/>
+        <p14:creationId xmlns:p14="http://schemas.microsoft.com/office/powerpoint/2010/main" xmlns="" val="1825348506"/>
       </p:ext>
     </p:extLst>
   </p:cSld>
@@ -13563,7 +13475,7 @@
     <a:masterClrMapping/>
   </p:clrMapOvr>
   <mc:AlternateContent xmlns:mc="http://schemas.openxmlformats.org/markup-compatibility/2006">
-    <mc:Choice xmlns="" xmlns:p14="http://schemas.microsoft.com/office/powerpoint/2010/main" Requires="p14">
+    <mc:Choice xmlns:p14="http://schemas.microsoft.com/office/powerpoint/2010/main" xmlns="" Requires="p14">
       <p:transition p14:dur="10"/>
     </mc:Choice>
     <mc:Fallback>
@@ -14096,7 +14008,7 @@
     </p:spTree>
     <p:extLst>
       <p:ext uri="{BB962C8B-B14F-4D97-AF65-F5344CB8AC3E}">
-        <p14:creationId xmlns="" xmlns:p14="http://schemas.microsoft.com/office/powerpoint/2010/main" val="525294539"/>
+        <p14:creationId xmlns:p14="http://schemas.microsoft.com/office/powerpoint/2010/main" xmlns="" val="525294539"/>
       </p:ext>
     </p:extLst>
   </p:cSld>
@@ -14104,7 +14016,7 @@
     <a:masterClrMapping/>
   </p:clrMapOvr>
   <mc:AlternateContent xmlns:mc="http://schemas.openxmlformats.org/markup-compatibility/2006">
-    <mc:Choice xmlns="" xmlns:p14="http://schemas.microsoft.com/office/powerpoint/2010/main" Requires="p14">
+    <mc:Choice xmlns:p14="http://schemas.microsoft.com/office/powerpoint/2010/main" xmlns="" Requires="p14">
       <p:transition p14:dur="10"/>
     </mc:Choice>
     <mc:Fallback>
@@ -14367,7 +14279,7 @@
           <a:blip r:embed="rId4">
             <a:extLst>
               <a:ext uri="{28A0092B-C50C-407E-A947-70E740481C1C}">
-                <a14:useLocalDpi xmlns="" xmlns:a14="http://schemas.microsoft.com/office/drawing/2010/main" val="0"/>
+                <a14:useLocalDpi xmlns:a14="http://schemas.microsoft.com/office/drawing/2010/main" xmlns="" val="0"/>
               </a:ext>
             </a:extLst>
           </a:blip>
@@ -14390,14 +14302,14 @@
           </a:ln>
           <a:extLst>
             <a:ext uri="{909E8E84-426E-40DD-AFC4-6F175D3DCCD1}">
-              <a14:hiddenFill xmlns="" xmlns:a14="http://schemas.microsoft.com/office/drawing/2010/main">
+              <a14:hiddenFill xmlns:a14="http://schemas.microsoft.com/office/drawing/2010/main" xmlns="">
                 <a:solidFill>
                   <a:schemeClr val="accent1"/>
                 </a:solidFill>
               </a14:hiddenFill>
             </a:ext>
             <a:ext uri="{91240B29-F687-4F45-9708-019B960494DF}">
-              <a14:hiddenLine xmlns="" xmlns:a14="http://schemas.microsoft.com/office/drawing/2010/main" w="9525">
+              <a14:hiddenLine xmlns:a14="http://schemas.microsoft.com/office/drawing/2010/main" xmlns="" w="9525">
                 <a:solidFill>
                   <a:schemeClr val="tx1"/>
                 </a:solidFill>
@@ -14421,7 +14333,7 @@
           <a:blip r:embed="rId5">
             <a:extLst>
               <a:ext uri="{28A0092B-C50C-407E-A947-70E740481C1C}">
-                <a14:useLocalDpi xmlns="" xmlns:a14="http://schemas.microsoft.com/office/drawing/2010/main" val="0"/>
+                <a14:useLocalDpi xmlns:a14="http://schemas.microsoft.com/office/drawing/2010/main" xmlns="" val="0"/>
               </a:ext>
             </a:extLst>
           </a:blip>
@@ -14444,14 +14356,14 @@
           </a:ln>
           <a:extLst>
             <a:ext uri="{909E8E84-426E-40DD-AFC4-6F175D3DCCD1}">
-              <a14:hiddenFill xmlns="" xmlns:a14="http://schemas.microsoft.com/office/drawing/2010/main">
+              <a14:hiddenFill xmlns:a14="http://schemas.microsoft.com/office/drawing/2010/main" xmlns="">
                 <a:solidFill>
                   <a:schemeClr val="accent1"/>
                 </a:solidFill>
               </a14:hiddenFill>
             </a:ext>
             <a:ext uri="{91240B29-F687-4F45-9708-019B960494DF}">
-              <a14:hiddenLine xmlns="" xmlns:a14="http://schemas.microsoft.com/office/drawing/2010/main" w="9525">
+              <a14:hiddenLine xmlns:a14="http://schemas.microsoft.com/office/drawing/2010/main" xmlns="" w="9525">
                 <a:solidFill>
                   <a:schemeClr val="tx1"/>
                 </a:solidFill>
@@ -14466,7 +14378,7 @@
     </p:spTree>
     <p:extLst>
       <p:ext uri="{BB962C8B-B14F-4D97-AF65-F5344CB8AC3E}">
-        <p14:creationId xmlns="" xmlns:p14="http://schemas.microsoft.com/office/powerpoint/2010/main" val="2111993876"/>
+        <p14:creationId xmlns:p14="http://schemas.microsoft.com/office/powerpoint/2010/main" xmlns="" val="2111993876"/>
       </p:ext>
     </p:extLst>
   </p:cSld>
@@ -14474,7 +14386,7 @@
     <a:masterClrMapping/>
   </p:clrMapOvr>
   <mc:AlternateContent xmlns:mc="http://schemas.openxmlformats.org/markup-compatibility/2006">
-    <mc:Choice xmlns="" xmlns:p14="http://schemas.microsoft.com/office/powerpoint/2010/main" Requires="p14">
+    <mc:Choice xmlns:p14="http://schemas.microsoft.com/office/powerpoint/2010/main" xmlns="" Requires="p14">
       <p:transition p14:dur="10"/>
     </mc:Choice>
     <mc:Fallback>
@@ -15047,7 +14959,7 @@
           <a:blip r:embed="rId3">
             <a:extLst>
               <a:ext uri="{28A0092B-C50C-407E-A947-70E740481C1C}">
-                <a14:useLocalDpi xmlns="" xmlns:a14="http://schemas.microsoft.com/office/drawing/2010/main" val="0"/>
+                <a14:useLocalDpi xmlns:a14="http://schemas.microsoft.com/office/drawing/2010/main" xmlns="" val="0"/>
               </a:ext>
             </a:extLst>
           </a:blip>
@@ -15070,14 +14982,14 @@
           </a:ln>
           <a:extLst>
             <a:ext uri="{909E8E84-426E-40DD-AFC4-6F175D3DCCD1}">
-              <a14:hiddenFill xmlns="" xmlns:a14="http://schemas.microsoft.com/office/drawing/2010/main">
+              <a14:hiddenFill xmlns:a14="http://schemas.microsoft.com/office/drawing/2010/main" xmlns="">
                 <a:solidFill>
                   <a:schemeClr val="accent1"/>
                 </a:solidFill>
               </a14:hiddenFill>
             </a:ext>
             <a:ext uri="{91240B29-F687-4F45-9708-019B960494DF}">
-              <a14:hiddenLine xmlns="" xmlns:a14="http://schemas.microsoft.com/office/drawing/2010/main" w="9525">
+              <a14:hiddenLine xmlns:a14="http://schemas.microsoft.com/office/drawing/2010/main" xmlns="" w="9525">
                 <a:solidFill>
                   <a:schemeClr val="tx1"/>
                 </a:solidFill>
@@ -15101,7 +15013,7 @@
           <a:blip r:embed="rId4">
             <a:extLst>
               <a:ext uri="{28A0092B-C50C-407E-A947-70E740481C1C}">
-                <a14:useLocalDpi xmlns="" xmlns:a14="http://schemas.microsoft.com/office/drawing/2010/main" val="0"/>
+                <a14:useLocalDpi xmlns:a14="http://schemas.microsoft.com/office/drawing/2010/main" xmlns="" val="0"/>
               </a:ext>
             </a:extLst>
           </a:blip>
@@ -15124,14 +15036,14 @@
           </a:ln>
           <a:extLst>
             <a:ext uri="{909E8E84-426E-40DD-AFC4-6F175D3DCCD1}">
-              <a14:hiddenFill xmlns="" xmlns:a14="http://schemas.microsoft.com/office/drawing/2010/main">
+              <a14:hiddenFill xmlns:a14="http://schemas.microsoft.com/office/drawing/2010/main" xmlns="">
                 <a:solidFill>
                   <a:schemeClr val="accent1"/>
                 </a:solidFill>
               </a14:hiddenFill>
             </a:ext>
             <a:ext uri="{91240B29-F687-4F45-9708-019B960494DF}">
-              <a14:hiddenLine xmlns="" xmlns:a14="http://schemas.microsoft.com/office/drawing/2010/main" w="9525">
+              <a14:hiddenLine xmlns:a14="http://schemas.microsoft.com/office/drawing/2010/main" xmlns="" w="9525">
                 <a:solidFill>
                   <a:schemeClr val="tx1"/>
                 </a:solidFill>
@@ -15146,7 +15058,7 @@
     </p:spTree>
     <p:extLst>
       <p:ext uri="{BB962C8B-B14F-4D97-AF65-F5344CB8AC3E}">
-        <p14:creationId xmlns="" xmlns:p14="http://schemas.microsoft.com/office/powerpoint/2010/main" val="2010681826"/>
+        <p14:creationId xmlns:p14="http://schemas.microsoft.com/office/powerpoint/2010/main" xmlns="" val="2010681826"/>
       </p:ext>
     </p:extLst>
   </p:cSld>
@@ -15154,7 +15066,7 @@
     <a:masterClrMapping/>
   </p:clrMapOvr>
   <mc:AlternateContent xmlns:mc="http://schemas.openxmlformats.org/markup-compatibility/2006">
-    <mc:Choice xmlns="" xmlns:p14="http://schemas.microsoft.com/office/powerpoint/2010/main" Requires="p14">
+    <mc:Choice xmlns:p14="http://schemas.microsoft.com/office/powerpoint/2010/main" xmlns="" Requires="p14">
       <p:transition p14:dur="10"/>
     </mc:Choice>
     <mc:Fallback>
@@ -15345,7 +15257,7 @@
           <a:blip r:embed="rId3">
             <a:extLst>
               <a:ext uri="{28A0092B-C50C-407E-A947-70E740481C1C}">
-                <a14:useLocalDpi xmlns="" xmlns:a14="http://schemas.microsoft.com/office/drawing/2010/main" val="0"/>
+                <a14:useLocalDpi xmlns:a14="http://schemas.microsoft.com/office/drawing/2010/main" xmlns="" val="0"/>
               </a:ext>
             </a:extLst>
           </a:blip>
@@ -15368,14 +15280,14 @@
           </a:ln>
           <a:extLst>
             <a:ext uri="{909E8E84-426E-40DD-AFC4-6F175D3DCCD1}">
-              <a14:hiddenFill xmlns="" xmlns:a14="http://schemas.microsoft.com/office/drawing/2010/main">
+              <a14:hiddenFill xmlns:a14="http://schemas.microsoft.com/office/drawing/2010/main" xmlns="">
                 <a:solidFill>
                   <a:schemeClr val="accent1"/>
                 </a:solidFill>
               </a14:hiddenFill>
             </a:ext>
             <a:ext uri="{91240B29-F687-4F45-9708-019B960494DF}">
-              <a14:hiddenLine xmlns="" xmlns:a14="http://schemas.microsoft.com/office/drawing/2010/main" w="9525">
+              <a14:hiddenLine xmlns:a14="http://schemas.microsoft.com/office/drawing/2010/main" xmlns="" w="9525">
                 <a:solidFill>
                   <a:schemeClr val="tx1"/>
                 </a:solidFill>
@@ -15390,7 +15302,7 @@
     </p:spTree>
     <p:extLst>
       <p:ext uri="{BB962C8B-B14F-4D97-AF65-F5344CB8AC3E}">
-        <p14:creationId xmlns="" xmlns:p14="http://schemas.microsoft.com/office/powerpoint/2010/main" val="206705609"/>
+        <p14:creationId xmlns:p14="http://schemas.microsoft.com/office/powerpoint/2010/main" xmlns="" val="206705609"/>
       </p:ext>
     </p:extLst>
   </p:cSld>
@@ -15398,7 +15310,7 @@
     <a:masterClrMapping/>
   </p:clrMapOvr>
   <mc:AlternateContent xmlns:mc="http://schemas.openxmlformats.org/markup-compatibility/2006">
-    <mc:Choice xmlns="" xmlns:p14="http://schemas.microsoft.com/office/powerpoint/2010/main" Requires="p14">
+    <mc:Choice xmlns:p14="http://schemas.microsoft.com/office/powerpoint/2010/main" xmlns="" Requires="p14">
       <p:transition p14:dur="10"/>
     </mc:Choice>
     <mc:Fallback>
@@ -15648,7 +15560,7 @@
           <a:blip r:embed="rId4">
             <a:extLst>
               <a:ext uri="{28A0092B-C50C-407E-A947-70E740481C1C}">
-                <a14:useLocalDpi xmlns="" xmlns:a14="http://schemas.microsoft.com/office/drawing/2010/main" val="0"/>
+                <a14:useLocalDpi xmlns:a14="http://schemas.microsoft.com/office/drawing/2010/main" xmlns="" val="0"/>
               </a:ext>
             </a:extLst>
           </a:blip>
@@ -15671,14 +15583,14 @@
           </a:ln>
           <a:extLst>
             <a:ext uri="{909E8E84-426E-40DD-AFC4-6F175D3DCCD1}">
-              <a14:hiddenFill xmlns="" xmlns:a14="http://schemas.microsoft.com/office/drawing/2010/main">
+              <a14:hiddenFill xmlns:a14="http://schemas.microsoft.com/office/drawing/2010/main" xmlns="">
                 <a:solidFill>
                   <a:schemeClr val="accent1"/>
                 </a:solidFill>
               </a14:hiddenFill>
             </a:ext>
             <a:ext uri="{91240B29-F687-4F45-9708-019B960494DF}">
-              <a14:hiddenLine xmlns="" xmlns:a14="http://schemas.microsoft.com/office/drawing/2010/main" w="9525">
+              <a14:hiddenLine xmlns:a14="http://schemas.microsoft.com/office/drawing/2010/main" xmlns="" w="9525">
                 <a:solidFill>
                   <a:schemeClr val="tx1"/>
                 </a:solidFill>
@@ -15693,7 +15605,7 @@
     </p:spTree>
     <p:extLst>
       <p:ext uri="{BB962C8B-B14F-4D97-AF65-F5344CB8AC3E}">
-        <p14:creationId xmlns="" xmlns:p14="http://schemas.microsoft.com/office/powerpoint/2010/main" val="1210066667"/>
+        <p14:creationId xmlns:p14="http://schemas.microsoft.com/office/powerpoint/2010/main" xmlns="" val="1210066667"/>
       </p:ext>
     </p:extLst>
   </p:cSld>
@@ -15701,7 +15613,7 @@
     <a:masterClrMapping/>
   </p:clrMapOvr>
   <mc:AlternateContent xmlns:mc="http://schemas.openxmlformats.org/markup-compatibility/2006">
-    <mc:Choice xmlns="" xmlns:p14="http://schemas.microsoft.com/office/powerpoint/2010/main" Requires="p14">
+    <mc:Choice xmlns:p14="http://schemas.microsoft.com/office/powerpoint/2010/main" xmlns="" Requires="p14">
       <p:transition p14:dur="10"/>
     </mc:Choice>
     <mc:Fallback>
@@ -15897,7 +15809,7 @@
     </p:spTree>
     <p:extLst>
       <p:ext uri="{BB962C8B-B14F-4D97-AF65-F5344CB8AC3E}">
-        <p14:creationId xmlns="" xmlns:p14="http://schemas.microsoft.com/office/powerpoint/2010/main" val="1232599275"/>
+        <p14:creationId xmlns:p14="http://schemas.microsoft.com/office/powerpoint/2010/main" xmlns="" val="1232599275"/>
       </p:ext>
     </p:extLst>
   </p:cSld>
@@ -15905,7 +15817,7 @@
     <a:masterClrMapping/>
   </p:clrMapOvr>
   <mc:AlternateContent xmlns:mc="http://schemas.openxmlformats.org/markup-compatibility/2006">
-    <mc:Choice xmlns="" xmlns:p14="http://schemas.microsoft.com/office/powerpoint/2010/main" Requires="p14">
+    <mc:Choice xmlns:p14="http://schemas.microsoft.com/office/powerpoint/2010/main" xmlns="" Requires="p14">
       <p:transition p14:dur="0"/>
     </mc:Choice>
     <mc:Fallback>
@@ -16215,14 +16127,31 @@
             </a:r>
             <a:r>
               <a:rPr lang="pl-PL" sz="850" dirty="0" smtClean="0"/>
-              <a:t>http://localhost:8090/products/3</a:t>
-            </a:r>
+              <a:t>http://localhost:8090/</a:t>
+            </a:r>
+            <a:r>
+              <a:rPr lang="pl-PL" sz="850" dirty="0" err="1" smtClean="0"/>
+              <a:t>records</a:t>
+            </a:r>
+            <a:r>
+              <a:rPr lang="pl-PL" sz="850" dirty="0" smtClean="0"/>
+              <a:t>/3</a:t>
+            </a:r>
+            <a:endParaRPr lang="pl-PL" sz="850" dirty="0" smtClean="0"/>
           </a:p>
           <a:p>
             <a:pPr lvl="1"/>
             <a:r>
               <a:rPr lang="pl-PL" sz="850" dirty="0" smtClean="0"/>
-              <a:t>Odpowiedź serwera ma status 404 Not </a:t>
+              <a:t>Odpowiedź serwera ma </a:t>
+            </a:r>
+            <a:r>
+              <a:rPr lang="pl-PL" sz="850" dirty="0" smtClean="0"/>
+              <a:t>status </a:t>
+            </a:r>
+            <a:r>
+              <a:rPr lang="pl-PL" sz="850" dirty="0" smtClean="0"/>
+              <a:t>404 Not </a:t>
             </a:r>
             <a:r>
               <a:rPr lang="pl-PL" sz="850" dirty="0" err="1" smtClean="0"/>
@@ -16274,7 +16203,7 @@
           <a:blip r:embed="rId4">
             <a:extLst>
               <a:ext uri="{28A0092B-C50C-407E-A947-70E740481C1C}">
-                <a14:useLocalDpi xmlns="" xmlns:a14="http://schemas.microsoft.com/office/drawing/2010/main" val="0"/>
+                <a14:useLocalDpi xmlns:a14="http://schemas.microsoft.com/office/drawing/2010/main" xmlns="" val="0"/>
               </a:ext>
             </a:extLst>
           </a:blip>
@@ -16297,14 +16226,14 @@
           </a:ln>
           <a:extLst>
             <a:ext uri="{909E8E84-426E-40DD-AFC4-6F175D3DCCD1}">
-              <a14:hiddenFill xmlns="" xmlns:a14="http://schemas.microsoft.com/office/drawing/2010/main">
+              <a14:hiddenFill xmlns:a14="http://schemas.microsoft.com/office/drawing/2010/main" xmlns="">
                 <a:solidFill>
                   <a:schemeClr val="accent1"/>
                 </a:solidFill>
               </a14:hiddenFill>
             </a:ext>
             <a:ext uri="{91240B29-F687-4F45-9708-019B960494DF}">
-              <a14:hiddenLine xmlns="" xmlns:a14="http://schemas.microsoft.com/office/drawing/2010/main" w="9525">
+              <a14:hiddenLine xmlns:a14="http://schemas.microsoft.com/office/drawing/2010/main" xmlns="" w="9525">
                 <a:solidFill>
                   <a:schemeClr val="tx1"/>
                 </a:solidFill>
@@ -16319,7 +16248,7 @@
     </p:spTree>
     <p:extLst>
       <p:ext uri="{BB962C8B-B14F-4D97-AF65-F5344CB8AC3E}">
-        <p14:creationId xmlns="" xmlns:p14="http://schemas.microsoft.com/office/powerpoint/2010/main" val="2788864210"/>
+        <p14:creationId xmlns:p14="http://schemas.microsoft.com/office/powerpoint/2010/main" xmlns="" val="2788864210"/>
       </p:ext>
     </p:extLst>
   </p:cSld>
@@ -16327,7 +16256,7 @@
     <a:masterClrMapping/>
   </p:clrMapOvr>
   <mc:AlternateContent xmlns:mc="http://schemas.openxmlformats.org/markup-compatibility/2006">
-    <mc:Choice xmlns="" xmlns:p14="http://schemas.microsoft.com/office/powerpoint/2010/main" Requires="p14">
+    <mc:Choice xmlns:p14="http://schemas.microsoft.com/office/powerpoint/2010/main" xmlns="" Requires="p14">
       <p:transition p14:dur="10"/>
     </mc:Choice>
     <mc:Fallback>
@@ -16476,8 +16405,21 @@
             </a:r>
             <a:r>
               <a:rPr lang="pl-PL" sz="850" dirty="0" smtClean="0"/>
-              <a:t>http://localhost:8090/products/2</a:t>
-            </a:r>
+              <a:t>http://</a:t>
+            </a:r>
+            <a:r>
+              <a:rPr lang="pl-PL" sz="850" dirty="0" smtClean="0"/>
+              <a:t>localhost:8090/</a:t>
+            </a:r>
+            <a:r>
+              <a:rPr lang="pl-PL" sz="850" dirty="0" err="1" smtClean="0"/>
+              <a:t>records</a:t>
+            </a:r>
+            <a:r>
+              <a:rPr lang="pl-PL" sz="850" dirty="0" smtClean="0"/>
+              <a:t>/2</a:t>
+            </a:r>
+            <a:endParaRPr lang="pl-PL" sz="850" dirty="0" smtClean="0"/>
           </a:p>
           <a:p>
             <a:pPr lvl="1"/>
@@ -16535,7 +16477,7 @@
           <a:blip r:embed="rId4">
             <a:extLst>
               <a:ext uri="{28A0092B-C50C-407E-A947-70E740481C1C}">
-                <a14:useLocalDpi xmlns="" xmlns:a14="http://schemas.microsoft.com/office/drawing/2010/main" val="0"/>
+                <a14:useLocalDpi xmlns:a14="http://schemas.microsoft.com/office/drawing/2010/main" xmlns="" val="0"/>
               </a:ext>
             </a:extLst>
           </a:blip>
@@ -16558,14 +16500,14 @@
           </a:ln>
           <a:extLst>
             <a:ext uri="{909E8E84-426E-40DD-AFC4-6F175D3DCCD1}">
-              <a14:hiddenFill xmlns="" xmlns:a14="http://schemas.microsoft.com/office/drawing/2010/main">
+              <a14:hiddenFill xmlns:a14="http://schemas.microsoft.com/office/drawing/2010/main" xmlns="">
                 <a:solidFill>
                   <a:schemeClr val="accent1"/>
                 </a:solidFill>
               </a14:hiddenFill>
             </a:ext>
             <a:ext uri="{91240B29-F687-4F45-9708-019B960494DF}">
-              <a14:hiddenLine xmlns="" xmlns:a14="http://schemas.microsoft.com/office/drawing/2010/main" w="9525">
+              <a14:hiddenLine xmlns:a14="http://schemas.microsoft.com/office/drawing/2010/main" xmlns="" w="9525">
                 <a:solidFill>
                   <a:schemeClr val="tx1"/>
                 </a:solidFill>
@@ -16580,7 +16522,7 @@
     </p:spTree>
     <p:extLst>
       <p:ext uri="{BB962C8B-B14F-4D97-AF65-F5344CB8AC3E}">
-        <p14:creationId xmlns="" xmlns:p14="http://schemas.microsoft.com/office/powerpoint/2010/main" val="59338049"/>
+        <p14:creationId xmlns:p14="http://schemas.microsoft.com/office/powerpoint/2010/main" xmlns="" val="59338049"/>
       </p:ext>
     </p:extLst>
   </p:cSld>
@@ -16588,7 +16530,7 @@
     <a:masterClrMapping/>
   </p:clrMapOvr>
   <mc:AlternateContent xmlns:mc="http://schemas.openxmlformats.org/markup-compatibility/2006">
-    <mc:Choice xmlns="" xmlns:p14="http://schemas.microsoft.com/office/powerpoint/2010/main" Requires="p14">
+    <mc:Choice xmlns:p14="http://schemas.microsoft.com/office/powerpoint/2010/main" xmlns="" Requires="p14">
       <p:transition p14:dur="10"/>
     </mc:Choice>
     <mc:Fallback>
@@ -16774,7 +16716,7 @@
           <a:blip r:embed="rId3">
             <a:extLst>
               <a:ext uri="{28A0092B-C50C-407E-A947-70E740481C1C}">
-                <a14:useLocalDpi xmlns="" xmlns:a14="http://schemas.microsoft.com/office/drawing/2010/main" val="0"/>
+                <a14:useLocalDpi xmlns:a14="http://schemas.microsoft.com/office/drawing/2010/main" xmlns="" val="0"/>
               </a:ext>
             </a:extLst>
           </a:blip>
@@ -16797,14 +16739,14 @@
           </a:ln>
           <a:extLst>
             <a:ext uri="{909E8E84-426E-40DD-AFC4-6F175D3DCCD1}">
-              <a14:hiddenFill xmlns="" xmlns:a14="http://schemas.microsoft.com/office/drawing/2010/main">
+              <a14:hiddenFill xmlns:a14="http://schemas.microsoft.com/office/drawing/2010/main" xmlns="">
                 <a:solidFill>
                   <a:schemeClr val="accent1"/>
                 </a:solidFill>
               </a14:hiddenFill>
             </a:ext>
             <a:ext uri="{91240B29-F687-4F45-9708-019B960494DF}">
-              <a14:hiddenLine xmlns="" xmlns:a14="http://schemas.microsoft.com/office/drawing/2010/main" w="9525">
+              <a14:hiddenLine xmlns:a14="http://schemas.microsoft.com/office/drawing/2010/main" xmlns="" w="9525">
                 <a:solidFill>
                   <a:schemeClr val="tx1"/>
                 </a:solidFill>
@@ -16819,7 +16761,7 @@
     </p:spTree>
     <p:extLst>
       <p:ext uri="{BB962C8B-B14F-4D97-AF65-F5344CB8AC3E}">
-        <p14:creationId xmlns="" xmlns:p14="http://schemas.microsoft.com/office/powerpoint/2010/main" val="1259301629"/>
+        <p14:creationId xmlns:p14="http://schemas.microsoft.com/office/powerpoint/2010/main" xmlns="" val="318999014"/>
       </p:ext>
     </p:extLst>
   </p:cSld>
@@ -16827,7 +16769,7 @@
     <a:masterClrMapping/>
   </p:clrMapOvr>
   <mc:AlternateContent xmlns:mc="http://schemas.openxmlformats.org/markup-compatibility/2006">
-    <mc:Choice xmlns="" xmlns:p14="http://schemas.microsoft.com/office/powerpoint/2010/main" Requires="p14">
+    <mc:Choice xmlns:p14="http://schemas.microsoft.com/office/powerpoint/2010/main" xmlns="" Requires="p14">
       <p:transition p14:dur="10"/>
     </mc:Choice>
     <mc:Fallback>
@@ -16845,245 +16787,6 @@
 </file>
 
 <file path=ppt/slides/slide33.xml><?xml version="1.0" encoding="utf-8"?>
-<p:sld xmlns:a="http://schemas.openxmlformats.org/drawingml/2006/main" xmlns:r="http://schemas.openxmlformats.org/officeDocument/2006/relationships" xmlns:p="http://schemas.openxmlformats.org/presentationml/2006/main">
-  <p:cSld>
-    <p:spTree>
-      <p:nvGrpSpPr>
-        <p:cNvPr id="1" name=""/>
-        <p:cNvGrpSpPr/>
-        <p:nvPr/>
-      </p:nvGrpSpPr>
-      <p:grpSpPr>
-        <a:xfrm>
-          <a:off x="0" y="0"/>
-          <a:ext cx="0" cy="0"/>
-          <a:chOff x="0" y="0"/>
-          <a:chExt cx="0" cy="0"/>
-        </a:xfrm>
-      </p:grpSpPr>
-      <p:sp>
-        <p:nvSpPr>
-          <p:cNvPr id="7" name="Titel 6"/>
-          <p:cNvSpPr>
-            <a:spLocks noGrp="1"/>
-          </p:cNvSpPr>
-          <p:nvPr>
-            <p:ph type="title"/>
-          </p:nvPr>
-        </p:nvSpPr>
-        <p:spPr>
-          <a:xfrm>
-            <a:off x="444503" y="347341"/>
-            <a:ext cx="6692104" cy="436017"/>
-          </a:xfrm>
-        </p:spPr>
-        <p:txBody>
-          <a:bodyPr/>
-          <a:lstStyle/>
-          <a:p>
-            <a:r>
-              <a:rPr lang="pl-PL" dirty="0" smtClean="0"/>
-              <a:t>Ćwiczenie REST </a:t>
-            </a:r>
-            <a:r>
-              <a:rPr lang="pl-PL" dirty="0"/>
-              <a:t>Server</a:t>
-            </a:r>
-            <a:r>
-              <a:rPr lang="pl-PL" dirty="0" smtClean="0"/>
-              <a:t/>
-            </a:r>
-            <a:br>
-              <a:rPr lang="pl-PL" dirty="0" smtClean="0"/>
-            </a:br>
-            <a:r>
-              <a:rPr lang="pl-PL" dirty="0" smtClean="0"/>
-              <a:t>Ćwiczenia z używania REST API</a:t>
-            </a:r>
-            <a:endParaRPr lang="de-DE" dirty="0"/>
-          </a:p>
-        </p:txBody>
-      </p:sp>
-      <p:sp>
-        <p:nvSpPr>
-          <p:cNvPr id="5" name="Inhaltsplatzhalter 4"/>
-          <p:cNvSpPr>
-            <a:spLocks noGrp="1"/>
-          </p:cNvSpPr>
-          <p:nvPr>
-            <p:ph type="body" sz="quarter" idx="13"/>
-          </p:nvPr>
-        </p:nvSpPr>
-        <p:spPr/>
-        <p:txBody>
-          <a:bodyPr/>
-          <a:lstStyle/>
-          <a:p>
-            <a:r>
-              <a:rPr lang="pl-PL" dirty="0" smtClean="0"/>
-              <a:t>ĆWICZENIE 3</a:t>
-            </a:r>
-            <a:endParaRPr lang="de-DE" dirty="0"/>
-          </a:p>
-        </p:txBody>
-      </p:sp>
-      <p:sp>
-        <p:nvSpPr>
-          <p:cNvPr id="30" name="Symbol zastępczy zawartości 1"/>
-          <p:cNvSpPr>
-            <a:spLocks noGrp="1"/>
-          </p:cNvSpPr>
-          <p:nvPr>
-            <p:ph idx="1"/>
-          </p:nvPr>
-        </p:nvSpPr>
-        <p:spPr>
-          <a:xfrm>
-            <a:off x="443708" y="1119187"/>
-            <a:ext cx="7861048" cy="693695"/>
-          </a:xfrm>
-        </p:spPr>
-        <p:txBody>
-          <a:bodyPr>
-            <a:normAutofit/>
-          </a:bodyPr>
-          <a:lstStyle/>
-          <a:p>
-            <a:r>
-              <a:rPr lang="pl-PL" sz="1050" dirty="0" smtClean="0"/>
-              <a:t>Sprawdźmy, czy album Marleya rzeczywiście został usunięty</a:t>
-            </a:r>
-          </a:p>
-          <a:p>
-            <a:pPr lvl="1"/>
-            <a:r>
-              <a:rPr lang="pl-PL" sz="850" dirty="0" smtClean="0"/>
-              <a:t>GET http://localhost:8090/records/2</a:t>
-            </a:r>
-          </a:p>
-          <a:p>
-            <a:pPr lvl="1"/>
-            <a:r>
-              <a:rPr lang="pl-PL" sz="850" dirty="0" smtClean="0"/>
-              <a:t>Odpowiedź serwera ma status 404 Not </a:t>
-            </a:r>
-            <a:r>
-              <a:rPr lang="pl-PL" sz="850" dirty="0" err="1" smtClean="0"/>
-              <a:t>Found</a:t>
-            </a:r>
-            <a:r>
-              <a:rPr lang="pl-PL" sz="850" dirty="0" smtClean="0"/>
-              <a:t> – zaimplementowanie ćwiczenia nie powinno tu akurat nic zmienić…</a:t>
-            </a:r>
-          </a:p>
-          <a:p>
-            <a:pPr lvl="2"/>
-            <a:endParaRPr lang="pl-PL" sz="850" dirty="0" smtClean="0"/>
-          </a:p>
-          <a:p>
-            <a:pPr lvl="1"/>
-            <a:endParaRPr lang="pl-PL" sz="850" dirty="0" smtClean="0"/>
-          </a:p>
-          <a:p>
-            <a:endParaRPr lang="pl-PL" dirty="0" smtClean="0"/>
-          </a:p>
-          <a:p>
-            <a:pPr marL="0" indent="0">
-              <a:buNone/>
-            </a:pPr>
-            <a:endParaRPr lang="pl-PL" dirty="0" smtClean="0"/>
-          </a:p>
-          <a:p>
-            <a:endParaRPr lang="pl-PL" dirty="0" smtClean="0"/>
-          </a:p>
-          <a:p>
-            <a:endParaRPr lang="pl-PL" dirty="0" smtClean="0"/>
-          </a:p>
-        </p:txBody>
-      </p:sp>
-      <p:pic>
-        <p:nvPicPr>
-          <p:cNvPr id="16386" name="Picture 2"/>
-          <p:cNvPicPr>
-            <a:picLocks noChangeAspect="1" noChangeArrowheads="1"/>
-          </p:cNvPicPr>
-          <p:nvPr/>
-        </p:nvPicPr>
-        <p:blipFill>
-          <a:blip r:embed="rId3">
-            <a:extLst>
-              <a:ext uri="{28A0092B-C50C-407E-A947-70E740481C1C}">
-                <a14:useLocalDpi xmlns="" xmlns:a14="http://schemas.microsoft.com/office/drawing/2010/main" val="0"/>
-              </a:ext>
-            </a:extLst>
-          </a:blip>
-          <a:srcRect/>
-          <a:stretch>
-            <a:fillRect/>
-          </a:stretch>
-        </p:blipFill>
-        <p:spPr bwMode="auto">
-          <a:xfrm>
-            <a:off x="1841587" y="1717307"/>
-            <a:ext cx="4922468" cy="2601244"/>
-          </a:xfrm>
-          <a:prstGeom prst="rect">
-            <a:avLst/>
-          </a:prstGeom>
-          <a:noFill/>
-          <a:ln>
-            <a:noFill/>
-          </a:ln>
-          <a:extLst>
-            <a:ext uri="{909E8E84-426E-40DD-AFC4-6F175D3DCCD1}">
-              <a14:hiddenFill xmlns="" xmlns:a14="http://schemas.microsoft.com/office/drawing/2010/main">
-                <a:solidFill>
-                  <a:schemeClr val="accent1"/>
-                </a:solidFill>
-              </a14:hiddenFill>
-            </a:ext>
-            <a:ext uri="{91240B29-F687-4F45-9708-019B960494DF}">
-              <a14:hiddenLine xmlns="" xmlns:a14="http://schemas.microsoft.com/office/drawing/2010/main" w="9525">
-                <a:solidFill>
-                  <a:schemeClr val="tx1"/>
-                </a:solidFill>
-                <a:miter lim="800000"/>
-                <a:headEnd/>
-                <a:tailEnd/>
-              </a14:hiddenLine>
-            </a:ext>
-          </a:extLst>
-        </p:spPr>
-      </p:pic>
-    </p:spTree>
-    <p:extLst>
-      <p:ext uri="{BB962C8B-B14F-4D97-AF65-F5344CB8AC3E}">
-        <p14:creationId xmlns="" xmlns:p14="http://schemas.microsoft.com/office/powerpoint/2010/main" val="318999014"/>
-      </p:ext>
-    </p:extLst>
-  </p:cSld>
-  <p:clrMapOvr>
-    <a:masterClrMapping/>
-  </p:clrMapOvr>
-  <mc:AlternateContent xmlns:mc="http://schemas.openxmlformats.org/markup-compatibility/2006">
-    <mc:Choice xmlns="" xmlns:p14="http://schemas.microsoft.com/office/powerpoint/2010/main" Requires="p14">
-      <p:transition p14:dur="10"/>
-    </mc:Choice>
-    <mc:Fallback>
-      <p:transition/>
-    </mc:Fallback>
-  </mc:AlternateContent>
-  <p:timing>
-    <p:tnLst>
-      <p:par>
-        <p:cTn id="1" dur="indefinite" restart="never" nodeType="tmRoot"/>
-      </p:par>
-    </p:tnLst>
-  </p:timing>
-</p:sld>
-</file>
-
-<file path=ppt/slides/slide34.xml><?xml version="1.0" encoding="utf-8"?>
 <p:sld xmlns:a="http://schemas.openxmlformats.org/drawingml/2006/main" xmlns:r="http://schemas.openxmlformats.org/officeDocument/2006/relationships" xmlns:p="http://schemas.openxmlformats.org/presentationml/2006/main">
   <p:cSld>
     <p:spTree>
@@ -17478,7 +17181,7 @@
     </p:spTree>
     <p:extLst>
       <p:ext uri="{BB962C8B-B14F-4D97-AF65-F5344CB8AC3E}">
-        <p14:creationId xmlns="" xmlns:p14="http://schemas.microsoft.com/office/powerpoint/2010/main" val="1953986883"/>
+        <p14:creationId xmlns:p14="http://schemas.microsoft.com/office/powerpoint/2010/main" xmlns="" val="1953986883"/>
       </p:ext>
     </p:extLst>
   </p:cSld>
@@ -17486,7 +17189,379 @@
     <a:masterClrMapping/>
   </p:clrMapOvr>
   <mc:AlternateContent xmlns:mc="http://schemas.openxmlformats.org/markup-compatibility/2006">
-    <mc:Choice xmlns="" xmlns:p14="http://schemas.microsoft.com/office/powerpoint/2010/main" Requires="p14">
+    <mc:Choice xmlns:p14="http://schemas.microsoft.com/office/powerpoint/2010/main" xmlns="" Requires="p14">
+      <p:transition p14:dur="10"/>
+    </mc:Choice>
+    <mc:Fallback>
+      <p:transition/>
+    </mc:Fallback>
+  </mc:AlternateContent>
+  <p:timing>
+    <p:tnLst>
+      <p:par>
+        <p:cTn id="1" dur="indefinite" restart="never" nodeType="tmRoot"/>
+      </p:par>
+    </p:tnLst>
+  </p:timing>
+</p:sld>
+</file>
+
+<file path=ppt/slides/slide34.xml><?xml version="1.0" encoding="utf-8"?>
+<p:sld xmlns:a="http://schemas.openxmlformats.org/drawingml/2006/main" xmlns:r="http://schemas.openxmlformats.org/officeDocument/2006/relationships" xmlns:p="http://schemas.openxmlformats.org/presentationml/2006/main">
+  <p:cSld>
+    <p:spTree>
+      <p:nvGrpSpPr>
+        <p:cNvPr id="1" name=""/>
+        <p:cNvGrpSpPr/>
+        <p:nvPr/>
+      </p:nvGrpSpPr>
+      <p:grpSpPr>
+        <a:xfrm>
+          <a:off x="0" y="0"/>
+          <a:ext cx="0" cy="0"/>
+          <a:chOff x="0" y="0"/>
+          <a:chExt cx="0" cy="0"/>
+        </a:xfrm>
+      </p:grpSpPr>
+      <p:sp>
+        <p:nvSpPr>
+          <p:cNvPr id="7" name="Titel 6"/>
+          <p:cNvSpPr>
+            <a:spLocks noGrp="1"/>
+          </p:cNvSpPr>
+          <p:nvPr>
+            <p:ph type="title"/>
+          </p:nvPr>
+        </p:nvSpPr>
+        <p:spPr/>
+        <p:txBody>
+          <a:bodyPr/>
+          <a:lstStyle/>
+          <a:p>
+            <a:r>
+              <a:rPr lang="pl-PL" dirty="0"/>
+              <a:t>Ćwiczenie REST </a:t>
+            </a:r>
+            <a:r>
+              <a:rPr lang="pl-PL" dirty="0" smtClean="0"/>
+              <a:t>Server</a:t>
+            </a:r>
+            <a:endParaRPr lang="de-DE" dirty="0"/>
+          </a:p>
+        </p:txBody>
+      </p:sp>
+      <p:sp>
+        <p:nvSpPr>
+          <p:cNvPr id="5" name="Inhaltsplatzhalter 4"/>
+          <p:cNvSpPr>
+            <a:spLocks noGrp="1"/>
+          </p:cNvSpPr>
+          <p:nvPr>
+            <p:ph type="body" sz="quarter" idx="13"/>
+          </p:nvPr>
+        </p:nvSpPr>
+        <p:spPr/>
+        <p:txBody>
+          <a:bodyPr/>
+          <a:lstStyle/>
+          <a:p>
+            <a:r>
+              <a:rPr lang="pl-PL" dirty="0" smtClean="0"/>
+              <a:t>ĆWICZENIE 3</a:t>
+            </a:r>
+            <a:endParaRPr lang="de-DE" dirty="0"/>
+          </a:p>
+        </p:txBody>
+      </p:sp>
+      <p:sp>
+        <p:nvSpPr>
+          <p:cNvPr id="4" name="Symbol zastępczy zawartości 1"/>
+          <p:cNvSpPr>
+            <a:spLocks noGrp="1"/>
+          </p:cNvSpPr>
+          <p:nvPr>
+            <p:ph idx="1"/>
+          </p:nvPr>
+        </p:nvSpPr>
+        <p:spPr>
+          <a:xfrm>
+            <a:off x="443708" y="1119187"/>
+            <a:ext cx="7986308" cy="3362325"/>
+          </a:xfrm>
+        </p:spPr>
+        <p:txBody>
+          <a:bodyPr>
+            <a:normAutofit/>
+          </a:bodyPr>
+          <a:lstStyle/>
+          <a:p>
+            <a:r>
+              <a:rPr lang="pl-PL" dirty="0" smtClean="0"/>
+              <a:t>Zadanie: zaimplementuj zasób sieciowy po stronie serwera.</a:t>
+            </a:r>
+          </a:p>
+          <a:p>
+            <a:pPr lvl="1"/>
+            <a:r>
+              <a:rPr lang="pl-PL" dirty="0" smtClean="0"/>
+              <a:t>Infrastruktura (serwer HTTP, deployment aplikacji) jest już zaimplementowany – zapoznaj się.</a:t>
+            </a:r>
+          </a:p>
+          <a:p>
+            <a:pPr lvl="2"/>
+            <a:r>
+              <a:rPr lang="pl-PL" dirty="0" smtClean="0"/>
+              <a:t>Tym razem używamy mechanizmu Context Dependency Injection (CDI) do wstrzykiwania </a:t>
+            </a:r>
+            <a:r>
+              <a:rPr lang="pl-PL" dirty="0"/>
+              <a:t>zależności (</a:t>
+            </a:r>
+            <a:r>
+              <a:rPr lang="pl-PL" dirty="0" smtClean="0"/>
+              <a:t>RecordInventory) do zasobów JAX-RS</a:t>
+            </a:r>
+          </a:p>
+          <a:p>
+            <a:pPr lvl="1"/>
+            <a:r>
+              <a:rPr lang="pl-PL" dirty="0" smtClean="0"/>
+              <a:t>Zmodyfikuj klasę wdsr.exercise3.record.rest.RecordResource</a:t>
+            </a:r>
+          </a:p>
+          <a:p>
+            <a:pPr lvl="1"/>
+            <a:r>
+              <a:rPr lang="pl-PL" dirty="0" smtClean="0"/>
+              <a:t>Zaimplementuj metody w tej klasie tak, aby działały zgodnie z dokumentacją </a:t>
+            </a:r>
+            <a:r>
+              <a:rPr lang="pl-PL" dirty="0" err="1" smtClean="0"/>
+              <a:t>javadoc</a:t>
+            </a:r>
+            <a:r>
+              <a:rPr lang="pl-PL" dirty="0" smtClean="0"/>
+              <a:t>.</a:t>
+            </a:r>
+          </a:p>
+          <a:p>
+            <a:pPr lvl="2"/>
+            <a:r>
+              <a:rPr lang="pl-PL" dirty="0" smtClean="0"/>
+              <a:t>Serwer używany w testach nasłuchuje pod adresem </a:t>
+            </a:r>
+            <a:r>
+              <a:rPr lang="pl-PL" dirty="0" smtClean="0">
+                <a:hlinkClick r:id="rId3"/>
+              </a:rPr>
+              <a:t>http://localhost:8091</a:t>
+            </a:r>
+            <a:endParaRPr lang="pl-PL" dirty="0" smtClean="0"/>
+          </a:p>
+          <a:p>
+            <a:pPr lvl="3"/>
+            <a:r>
+              <a:rPr lang="pl-PL" dirty="0" smtClean="0"/>
+              <a:t>W razie konfliktu portów (</a:t>
+            </a:r>
+            <a:r>
+              <a:rPr lang="en-US" sz="800" dirty="0"/>
+              <a:t>Address already in use: bind</a:t>
+            </a:r>
+            <a:r>
+              <a:rPr lang="pl-PL" dirty="0" smtClean="0"/>
+              <a:t>) zmień numer portu w klasie </a:t>
+            </a:r>
+            <a:r>
+              <a:rPr lang="pl-PL" dirty="0" err="1" smtClean="0"/>
+              <a:t>RecordResourceTest</a:t>
+            </a:r>
+            <a:r>
+              <a:rPr lang="pl-PL" dirty="0" smtClean="0"/>
+              <a:t>.</a:t>
+            </a:r>
+          </a:p>
+          <a:p>
+            <a:pPr lvl="1"/>
+            <a:r>
+              <a:rPr lang="pl-PL" dirty="0" smtClean="0"/>
+              <a:t>Spójrz na klasę </a:t>
+            </a:r>
+            <a:r>
+              <a:rPr lang="pl-PL" dirty="0" err="1" smtClean="0"/>
+              <a:t>ProductResource</a:t>
+            </a:r>
+            <a:r>
+              <a:rPr lang="pl-PL" dirty="0" smtClean="0"/>
+              <a:t> z ćwiczenia REST Client aby zobaczyć, jak można zaimplementować poszczególne operacje.</a:t>
+            </a:r>
+          </a:p>
+          <a:p>
+            <a:pPr marL="0" indent="0">
+              <a:buNone/>
+            </a:pPr>
+            <a:endParaRPr lang="pl-PL" dirty="0" smtClean="0"/>
+          </a:p>
+          <a:p>
+            <a:r>
+              <a:rPr lang="pl-PL" dirty="0" smtClean="0"/>
+              <a:t>Zasoby:</a:t>
+            </a:r>
+          </a:p>
+          <a:p>
+            <a:pPr lvl="1"/>
+            <a:r>
+              <a:rPr lang="pl-PL" dirty="0" smtClean="0"/>
+              <a:t>JAX-RS 2.0 </a:t>
+            </a:r>
+            <a:r>
+              <a:rPr lang="pl-PL" dirty="0" err="1" smtClean="0"/>
+              <a:t>JavaDoc</a:t>
+            </a:r>
+            <a:r>
+              <a:rPr lang="pl-PL" dirty="0" smtClean="0"/>
+              <a:t>: </a:t>
+            </a:r>
+            <a:r>
+              <a:rPr lang="pl-PL" dirty="0" smtClean="0">
+                <a:hlinkClick r:id="rId4"/>
+              </a:rPr>
+              <a:t>https</a:t>
+            </a:r>
+            <a:r>
+              <a:rPr lang="pl-PL" dirty="0">
+                <a:hlinkClick r:id="rId4"/>
+              </a:rPr>
+              <a:t>://</a:t>
+            </a:r>
+            <a:r>
+              <a:rPr lang="pl-PL" dirty="0" smtClean="0">
+                <a:hlinkClick r:id="rId4"/>
+              </a:rPr>
+              <a:t>jax-rs-spec.java.net/nonav/2.0-rev-a/apidocs/index.html</a:t>
+            </a:r>
+            <a:endParaRPr lang="pl-PL" dirty="0" smtClean="0"/>
+          </a:p>
+          <a:p>
+            <a:pPr lvl="1"/>
+            <a:r>
+              <a:rPr lang="pl-PL" dirty="0" err="1" smtClean="0"/>
+              <a:t>Building</a:t>
+            </a:r>
+            <a:r>
+              <a:rPr lang="pl-PL" dirty="0" smtClean="0"/>
+              <a:t> </a:t>
+            </a:r>
+            <a:r>
+              <a:rPr lang="pl-PL" dirty="0" err="1" smtClean="0"/>
+              <a:t>RESTful</a:t>
+            </a:r>
+            <a:r>
+              <a:rPr lang="pl-PL" dirty="0" smtClean="0"/>
+              <a:t> Web Services </a:t>
+            </a:r>
+            <a:r>
+              <a:rPr lang="pl-PL" dirty="0"/>
+              <a:t>with JAX-RS: </a:t>
+            </a:r>
+            <a:r>
+              <a:rPr lang="pl-PL" dirty="0">
+                <a:hlinkClick r:id="rId5"/>
+              </a:rPr>
+              <a:t>http://</a:t>
+            </a:r>
+            <a:r>
+              <a:rPr lang="pl-PL" dirty="0" smtClean="0">
+                <a:hlinkClick r:id="rId5"/>
+              </a:rPr>
+              <a:t>docs.oracle.com/javaee/6/tutorial/doc/giepu.html</a:t>
+            </a:r>
+            <a:endParaRPr lang="pl-PL" dirty="0" smtClean="0"/>
+          </a:p>
+        </p:txBody>
+      </p:sp>
+      <p:sp>
+        <p:nvSpPr>
+          <p:cNvPr id="6" name="pole tekstowe 5"/>
+          <p:cNvSpPr txBox="1"/>
+          <p:nvPr/>
+        </p:nvSpPr>
+        <p:spPr bwMode="auto">
+          <a:xfrm>
+            <a:off x="427303" y="4291512"/>
+            <a:ext cx="6751848" cy="518091"/>
+          </a:xfrm>
+          <a:prstGeom prst="rect">
+            <a:avLst/>
+          </a:prstGeom>
+          <a:noFill/>
+          <a:ln w="9525">
+            <a:noFill/>
+            <a:miter lim="800000"/>
+            <a:headEnd/>
+            <a:tailEnd/>
+          </a:ln>
+        </p:spPr>
+        <p:txBody>
+          <a:bodyPr wrap="none" lIns="0" tIns="0" rIns="0" bIns="0" rtlCol="0">
+            <a:spAutoFit/>
+          </a:bodyPr>
+          <a:lstStyle/>
+          <a:p>
+            <a:pPr>
+              <a:spcBef>
+                <a:spcPts val="100"/>
+              </a:spcBef>
+              <a:spcAft>
+                <a:spcPts val="100"/>
+              </a:spcAft>
+            </a:pPr>
+            <a:r>
+              <a:rPr lang="pl-PL" sz="1600" b="1" dirty="0" smtClean="0">
+                <a:solidFill>
+                  <a:srgbClr val="00B050"/>
+                </a:solidFill>
+              </a:rPr>
+              <a:t>Ostateczny termin zaliczenia ćwiczenia: czwartek 20 kwietnia</a:t>
+            </a:r>
+          </a:p>
+          <a:p>
+            <a:pPr>
+              <a:spcBef>
+                <a:spcPts val="100"/>
+              </a:spcBef>
+              <a:spcAft>
+                <a:spcPts val="100"/>
+              </a:spcAft>
+            </a:pPr>
+            <a:r>
+              <a:rPr lang="pl-PL" sz="1600" b="1" dirty="0" smtClean="0">
+                <a:solidFill>
+                  <a:srgbClr val="00B050"/>
+                </a:solidFill>
+              </a:rPr>
+              <a:t>Rozwiązania dostarczone później nie będą uwzględniane (0 punktów)</a:t>
+            </a:r>
+            <a:endParaRPr lang="pl-PL" sz="1600" b="1" dirty="0">
+              <a:solidFill>
+                <a:srgbClr val="00B050"/>
+              </a:solidFill>
+            </a:endParaRPr>
+          </a:p>
+        </p:txBody>
+      </p:sp>
+    </p:spTree>
+    <p:extLst>
+      <p:ext uri="{BB962C8B-B14F-4D97-AF65-F5344CB8AC3E}">
+        <p14:creationId xmlns:p14="http://schemas.microsoft.com/office/powerpoint/2010/main" xmlns="" val="3439529518"/>
+      </p:ext>
+    </p:extLst>
+  </p:cSld>
+  <p:clrMapOvr>
+    <a:masterClrMapping/>
+  </p:clrMapOvr>
+  <mc:AlternateContent xmlns:mc="http://schemas.openxmlformats.org/markup-compatibility/2006">
+    <mc:Choice xmlns:p14="http://schemas.microsoft.com/office/powerpoint/2010/main" xmlns="" Requires="p14">
       <p:transition p14:dur="10"/>
     </mc:Choice>
     <mc:Fallback>
@@ -17522,378 +17597,6 @@
       </p:grpSpPr>
       <p:sp>
         <p:nvSpPr>
-          <p:cNvPr id="7" name="Titel 6"/>
-          <p:cNvSpPr>
-            <a:spLocks noGrp="1"/>
-          </p:cNvSpPr>
-          <p:nvPr>
-            <p:ph type="title"/>
-          </p:nvPr>
-        </p:nvSpPr>
-        <p:spPr/>
-        <p:txBody>
-          <a:bodyPr/>
-          <a:lstStyle/>
-          <a:p>
-            <a:r>
-              <a:rPr lang="pl-PL" dirty="0"/>
-              <a:t>Ćwiczenie REST </a:t>
-            </a:r>
-            <a:r>
-              <a:rPr lang="pl-PL" dirty="0" smtClean="0"/>
-              <a:t>Server</a:t>
-            </a:r>
-            <a:endParaRPr lang="de-DE" dirty="0"/>
-          </a:p>
-        </p:txBody>
-      </p:sp>
-      <p:sp>
-        <p:nvSpPr>
-          <p:cNvPr id="5" name="Inhaltsplatzhalter 4"/>
-          <p:cNvSpPr>
-            <a:spLocks noGrp="1"/>
-          </p:cNvSpPr>
-          <p:nvPr>
-            <p:ph type="body" sz="quarter" idx="13"/>
-          </p:nvPr>
-        </p:nvSpPr>
-        <p:spPr/>
-        <p:txBody>
-          <a:bodyPr/>
-          <a:lstStyle/>
-          <a:p>
-            <a:r>
-              <a:rPr lang="pl-PL" dirty="0" smtClean="0"/>
-              <a:t>ĆWICZENIE 3</a:t>
-            </a:r>
-            <a:endParaRPr lang="de-DE" dirty="0"/>
-          </a:p>
-        </p:txBody>
-      </p:sp>
-      <p:sp>
-        <p:nvSpPr>
-          <p:cNvPr id="4" name="Symbol zastępczy zawartości 1"/>
-          <p:cNvSpPr>
-            <a:spLocks noGrp="1"/>
-          </p:cNvSpPr>
-          <p:nvPr>
-            <p:ph idx="1"/>
-          </p:nvPr>
-        </p:nvSpPr>
-        <p:spPr>
-          <a:xfrm>
-            <a:off x="443708" y="1119187"/>
-            <a:ext cx="7986308" cy="3362325"/>
-          </a:xfrm>
-        </p:spPr>
-        <p:txBody>
-          <a:bodyPr>
-            <a:normAutofit/>
-          </a:bodyPr>
-          <a:lstStyle/>
-          <a:p>
-            <a:r>
-              <a:rPr lang="pl-PL" dirty="0" smtClean="0"/>
-              <a:t>Zadanie: zaimplementuj zasób sieciowy po stronie serwera.</a:t>
-            </a:r>
-          </a:p>
-          <a:p>
-            <a:pPr lvl="1"/>
-            <a:r>
-              <a:rPr lang="pl-PL" dirty="0" smtClean="0"/>
-              <a:t>Infrastruktura (serwer HTTP, deployment aplikacji) jest już zaimplementowany – zapoznaj się.</a:t>
-            </a:r>
-          </a:p>
-          <a:p>
-            <a:pPr lvl="2"/>
-            <a:r>
-              <a:rPr lang="pl-PL" dirty="0" smtClean="0"/>
-              <a:t>Tym razem używamy mechanizmu Context Dependency Injection (CDI) do wstrzykiwania </a:t>
-            </a:r>
-            <a:r>
-              <a:rPr lang="pl-PL" dirty="0"/>
-              <a:t>zależności (</a:t>
-            </a:r>
-            <a:r>
-              <a:rPr lang="pl-PL" dirty="0" smtClean="0"/>
-              <a:t>RecordInventory) do zasobów JAX-RS</a:t>
-            </a:r>
-          </a:p>
-          <a:p>
-            <a:pPr lvl="1"/>
-            <a:r>
-              <a:rPr lang="pl-PL" dirty="0" smtClean="0"/>
-              <a:t>Zmodyfikuj klasę wdsr.exercise3.record.rest.RecordResource</a:t>
-            </a:r>
-          </a:p>
-          <a:p>
-            <a:pPr lvl="1"/>
-            <a:r>
-              <a:rPr lang="pl-PL" dirty="0" smtClean="0"/>
-              <a:t>Zaimplementuj metody w tej klasie tak, aby działały zgodnie z dokumentacją </a:t>
-            </a:r>
-            <a:r>
-              <a:rPr lang="pl-PL" dirty="0" err="1" smtClean="0"/>
-              <a:t>javadoc</a:t>
-            </a:r>
-            <a:r>
-              <a:rPr lang="pl-PL" dirty="0" smtClean="0"/>
-              <a:t>.</a:t>
-            </a:r>
-          </a:p>
-          <a:p>
-            <a:pPr lvl="2"/>
-            <a:r>
-              <a:rPr lang="pl-PL" dirty="0" smtClean="0"/>
-              <a:t>Serwer używany w testach nasłuchuje pod adresem </a:t>
-            </a:r>
-            <a:r>
-              <a:rPr lang="pl-PL" dirty="0" smtClean="0">
-                <a:hlinkClick r:id="rId3"/>
-              </a:rPr>
-              <a:t>http://localhost:8091</a:t>
-            </a:r>
-            <a:endParaRPr lang="pl-PL" dirty="0" smtClean="0"/>
-          </a:p>
-          <a:p>
-            <a:pPr lvl="3"/>
-            <a:r>
-              <a:rPr lang="pl-PL" dirty="0" smtClean="0"/>
-              <a:t>W razie konfliktu portów (</a:t>
-            </a:r>
-            <a:r>
-              <a:rPr lang="en-US" sz="800" dirty="0"/>
-              <a:t>Address already in use: bind</a:t>
-            </a:r>
-            <a:r>
-              <a:rPr lang="pl-PL" dirty="0" smtClean="0"/>
-              <a:t>) zmień numer portu w klasie </a:t>
-            </a:r>
-            <a:r>
-              <a:rPr lang="pl-PL" dirty="0" err="1" smtClean="0"/>
-              <a:t>RecordResourceTest</a:t>
-            </a:r>
-            <a:r>
-              <a:rPr lang="pl-PL" dirty="0" smtClean="0"/>
-              <a:t>.</a:t>
-            </a:r>
-          </a:p>
-          <a:p>
-            <a:pPr lvl="1"/>
-            <a:r>
-              <a:rPr lang="pl-PL" dirty="0" smtClean="0"/>
-              <a:t>Spójrz na klasę </a:t>
-            </a:r>
-            <a:r>
-              <a:rPr lang="pl-PL" dirty="0" err="1" smtClean="0"/>
-              <a:t>ProductResource</a:t>
-            </a:r>
-            <a:r>
-              <a:rPr lang="pl-PL" dirty="0" smtClean="0"/>
-              <a:t> z ćwiczenia REST Client aby zobaczyć, jak można zaimplementować poszczególne operacje.</a:t>
-            </a:r>
-          </a:p>
-          <a:p>
-            <a:pPr marL="0" indent="0">
-              <a:buNone/>
-            </a:pPr>
-            <a:endParaRPr lang="pl-PL" dirty="0" smtClean="0"/>
-          </a:p>
-          <a:p>
-            <a:r>
-              <a:rPr lang="pl-PL" dirty="0" smtClean="0"/>
-              <a:t>Zasoby:</a:t>
-            </a:r>
-          </a:p>
-          <a:p>
-            <a:pPr lvl="1"/>
-            <a:r>
-              <a:rPr lang="pl-PL" dirty="0" smtClean="0"/>
-              <a:t>JAX-RS 2.0 </a:t>
-            </a:r>
-            <a:r>
-              <a:rPr lang="pl-PL" dirty="0" err="1" smtClean="0"/>
-              <a:t>JavaDoc</a:t>
-            </a:r>
-            <a:r>
-              <a:rPr lang="pl-PL" dirty="0" smtClean="0"/>
-              <a:t>: </a:t>
-            </a:r>
-            <a:r>
-              <a:rPr lang="pl-PL" dirty="0" smtClean="0">
-                <a:hlinkClick r:id="rId4"/>
-              </a:rPr>
-              <a:t>https</a:t>
-            </a:r>
-            <a:r>
-              <a:rPr lang="pl-PL" dirty="0">
-                <a:hlinkClick r:id="rId4"/>
-              </a:rPr>
-              <a:t>://</a:t>
-            </a:r>
-            <a:r>
-              <a:rPr lang="pl-PL" dirty="0" smtClean="0">
-                <a:hlinkClick r:id="rId4"/>
-              </a:rPr>
-              <a:t>jax-rs-spec.java.net/nonav/2.0-rev-a/apidocs/index.html</a:t>
-            </a:r>
-            <a:endParaRPr lang="pl-PL" dirty="0" smtClean="0"/>
-          </a:p>
-          <a:p>
-            <a:pPr lvl="1"/>
-            <a:r>
-              <a:rPr lang="pl-PL" dirty="0" err="1" smtClean="0"/>
-              <a:t>Building</a:t>
-            </a:r>
-            <a:r>
-              <a:rPr lang="pl-PL" dirty="0" smtClean="0"/>
-              <a:t> </a:t>
-            </a:r>
-            <a:r>
-              <a:rPr lang="pl-PL" dirty="0" err="1" smtClean="0"/>
-              <a:t>RESTful</a:t>
-            </a:r>
-            <a:r>
-              <a:rPr lang="pl-PL" dirty="0" smtClean="0"/>
-              <a:t> Web Services </a:t>
-            </a:r>
-            <a:r>
-              <a:rPr lang="pl-PL" dirty="0"/>
-              <a:t>with JAX-RS: </a:t>
-            </a:r>
-            <a:r>
-              <a:rPr lang="pl-PL" dirty="0">
-                <a:hlinkClick r:id="rId5"/>
-              </a:rPr>
-              <a:t>http://</a:t>
-            </a:r>
-            <a:r>
-              <a:rPr lang="pl-PL" dirty="0" smtClean="0">
-                <a:hlinkClick r:id="rId5"/>
-              </a:rPr>
-              <a:t>docs.oracle.com/javaee/6/tutorial/doc/giepu.html</a:t>
-            </a:r>
-            <a:endParaRPr lang="pl-PL" dirty="0" smtClean="0"/>
-          </a:p>
-        </p:txBody>
-      </p:sp>
-      <p:sp>
-        <p:nvSpPr>
-          <p:cNvPr id="6" name="pole tekstowe 5"/>
-          <p:cNvSpPr txBox="1"/>
-          <p:nvPr/>
-        </p:nvSpPr>
-        <p:spPr bwMode="auto">
-          <a:xfrm>
-            <a:off x="427303" y="4291512"/>
-            <a:ext cx="6751848" cy="518091"/>
-          </a:xfrm>
-          <a:prstGeom prst="rect">
-            <a:avLst/>
-          </a:prstGeom>
-          <a:noFill/>
-          <a:ln w="9525">
-            <a:noFill/>
-            <a:miter lim="800000"/>
-            <a:headEnd/>
-            <a:tailEnd/>
-          </a:ln>
-        </p:spPr>
-        <p:txBody>
-          <a:bodyPr wrap="none" lIns="0" tIns="0" rIns="0" bIns="0" rtlCol="0">
-            <a:spAutoFit/>
-          </a:bodyPr>
-          <a:lstStyle/>
-          <a:p>
-            <a:pPr>
-              <a:spcBef>
-                <a:spcPts val="100"/>
-              </a:spcBef>
-              <a:spcAft>
-                <a:spcPts val="100"/>
-              </a:spcAft>
-            </a:pPr>
-            <a:r>
-              <a:rPr lang="pl-PL" sz="1600" b="1" dirty="0" smtClean="0">
-                <a:solidFill>
-                  <a:srgbClr val="00B050"/>
-                </a:solidFill>
-              </a:rPr>
-              <a:t>Ostateczny termin zaliczenia ćwiczenia: czwartek 20 kwietnia</a:t>
-            </a:r>
-          </a:p>
-          <a:p>
-            <a:pPr>
-              <a:spcBef>
-                <a:spcPts val="100"/>
-              </a:spcBef>
-              <a:spcAft>
-                <a:spcPts val="100"/>
-              </a:spcAft>
-            </a:pPr>
-            <a:r>
-              <a:rPr lang="pl-PL" sz="1600" b="1" dirty="0" smtClean="0">
-                <a:solidFill>
-                  <a:srgbClr val="00B050"/>
-                </a:solidFill>
-              </a:rPr>
-              <a:t>Rozwiązania dostarczone później nie będą uwzględniane (0 punktów)</a:t>
-            </a:r>
-            <a:endParaRPr lang="pl-PL" sz="1600" b="1" dirty="0">
-              <a:solidFill>
-                <a:srgbClr val="00B050"/>
-              </a:solidFill>
-            </a:endParaRPr>
-          </a:p>
-        </p:txBody>
-      </p:sp>
-    </p:spTree>
-    <p:extLst>
-      <p:ext uri="{BB962C8B-B14F-4D97-AF65-F5344CB8AC3E}">
-        <p14:creationId xmlns="" xmlns:p14="http://schemas.microsoft.com/office/powerpoint/2010/main" val="3439529518"/>
-      </p:ext>
-    </p:extLst>
-  </p:cSld>
-  <p:clrMapOvr>
-    <a:masterClrMapping/>
-  </p:clrMapOvr>
-  <mc:AlternateContent xmlns:mc="http://schemas.openxmlformats.org/markup-compatibility/2006">
-    <mc:Choice xmlns="" xmlns:p14="http://schemas.microsoft.com/office/powerpoint/2010/main" Requires="p14">
-      <p:transition p14:dur="10"/>
-    </mc:Choice>
-    <mc:Fallback>
-      <p:transition/>
-    </mc:Fallback>
-  </mc:AlternateContent>
-  <p:timing>
-    <p:tnLst>
-      <p:par>
-        <p:cTn id="1" dur="indefinite" restart="never" nodeType="tmRoot"/>
-      </p:par>
-    </p:tnLst>
-  </p:timing>
-</p:sld>
-</file>
-
-<file path=ppt/slides/slide36.xml><?xml version="1.0" encoding="utf-8"?>
-<p:sld xmlns:a="http://schemas.openxmlformats.org/drawingml/2006/main" xmlns:r="http://schemas.openxmlformats.org/officeDocument/2006/relationships" xmlns:p="http://schemas.openxmlformats.org/presentationml/2006/main">
-  <p:cSld>
-    <p:spTree>
-      <p:nvGrpSpPr>
-        <p:cNvPr id="1" name=""/>
-        <p:cNvGrpSpPr/>
-        <p:nvPr/>
-      </p:nvGrpSpPr>
-      <p:grpSpPr>
-        <a:xfrm>
-          <a:off x="0" y="0"/>
-          <a:ext cx="0" cy="0"/>
-          <a:chOff x="0" y="0"/>
-          <a:chExt cx="0" cy="0"/>
-        </a:xfrm>
-      </p:grpSpPr>
-      <p:sp>
-        <p:nvSpPr>
           <p:cNvPr id="2" name="Untertitel 1"/>
           <p:cNvSpPr>
             <a:spLocks noGrp="1"/>
@@ -17986,7 +17689,7 @@
     </p:spTree>
     <p:extLst>
       <p:ext uri="{BB962C8B-B14F-4D97-AF65-F5344CB8AC3E}">
-        <p14:creationId xmlns="" xmlns:p14="http://schemas.microsoft.com/office/powerpoint/2010/main" val="1405177657"/>
+        <p14:creationId xmlns:p14="http://schemas.microsoft.com/office/powerpoint/2010/main" xmlns="" val="1405177657"/>
       </p:ext>
     </p:extLst>
   </p:cSld>
@@ -18231,7 +17934,7 @@
     </p:spTree>
     <p:extLst>
       <p:ext uri="{BB962C8B-B14F-4D97-AF65-F5344CB8AC3E}">
-        <p14:creationId xmlns="" xmlns:p14="http://schemas.microsoft.com/office/powerpoint/2010/main" val="2153401368"/>
+        <p14:creationId xmlns:p14="http://schemas.microsoft.com/office/powerpoint/2010/main" xmlns="" val="2153401368"/>
       </p:ext>
     </p:extLst>
   </p:cSld>
@@ -18239,7 +17942,7 @@
     <a:masterClrMapping/>
   </p:clrMapOvr>
   <mc:AlternateContent xmlns:mc="http://schemas.openxmlformats.org/markup-compatibility/2006">
-    <mc:Choice xmlns="" xmlns:p14="http://schemas.microsoft.com/office/powerpoint/2010/main" Requires="p14">
+    <mc:Choice xmlns:p14="http://schemas.microsoft.com/office/powerpoint/2010/main" xmlns="" Requires="p14">
       <p:transition p14:dur="0"/>
     </mc:Choice>
     <mc:Fallback>
@@ -19020,7 +18723,7 @@
     </p:spTree>
     <p:extLst>
       <p:ext uri="{BB962C8B-B14F-4D97-AF65-F5344CB8AC3E}">
-        <p14:creationId xmlns="" xmlns:p14="http://schemas.microsoft.com/office/powerpoint/2010/main" val="929143175"/>
+        <p14:creationId xmlns:p14="http://schemas.microsoft.com/office/powerpoint/2010/main" xmlns="" val="929143175"/>
       </p:ext>
     </p:extLst>
   </p:cSld>
@@ -19028,7 +18731,7 @@
     <a:masterClrMapping/>
   </p:clrMapOvr>
   <mc:AlternateContent xmlns:mc="http://schemas.openxmlformats.org/markup-compatibility/2006">
-    <mc:Choice xmlns="" xmlns:p14="http://schemas.microsoft.com/office/powerpoint/2010/main" Requires="p14">
+    <mc:Choice xmlns:p14="http://schemas.microsoft.com/office/powerpoint/2010/main" xmlns="" Requires="p14">
       <p:transition p14:dur="0"/>
     </mc:Choice>
     <mc:Fallback>
@@ -19622,7 +19325,7 @@
     </p:spTree>
     <p:extLst>
       <p:ext uri="{BB962C8B-B14F-4D97-AF65-F5344CB8AC3E}">
-        <p14:creationId xmlns="" xmlns:p14="http://schemas.microsoft.com/office/powerpoint/2010/main" val="1819882541"/>
+        <p14:creationId xmlns:p14="http://schemas.microsoft.com/office/powerpoint/2010/main" xmlns="" val="1819882541"/>
       </p:ext>
     </p:extLst>
   </p:cSld>
@@ -19630,7 +19333,7 @@
     <a:masterClrMapping/>
   </p:clrMapOvr>
   <mc:AlternateContent xmlns:mc="http://schemas.openxmlformats.org/markup-compatibility/2006">
-    <mc:Choice xmlns="" xmlns:p14="http://schemas.microsoft.com/office/powerpoint/2010/main" Requires="p14">
+    <mc:Choice xmlns:p14="http://schemas.microsoft.com/office/powerpoint/2010/main" xmlns="" Requires="p14">
       <p:transition p14:dur="0"/>
     </mc:Choice>
     <mc:Fallback>
@@ -19773,7 +19476,7 @@
     </p:spTree>
     <p:extLst>
       <p:ext uri="{BB962C8B-B14F-4D97-AF65-F5344CB8AC3E}">
-        <p14:creationId xmlns="" xmlns:p14="http://schemas.microsoft.com/office/powerpoint/2010/main" val="771745050"/>
+        <p14:creationId xmlns:p14="http://schemas.microsoft.com/office/powerpoint/2010/main" xmlns="" val="771745050"/>
       </p:ext>
     </p:extLst>
   </p:cSld>
@@ -19781,7 +19484,7 @@
     <a:masterClrMapping/>
   </p:clrMapOvr>
   <mc:AlternateContent xmlns:mc="http://schemas.openxmlformats.org/markup-compatibility/2006">
-    <mc:Choice xmlns="" xmlns:p14="http://schemas.microsoft.com/office/powerpoint/2010/main" Requires="p14">
+    <mc:Choice xmlns:p14="http://schemas.microsoft.com/office/powerpoint/2010/main" xmlns="" Requires="p14">
       <p:transition p14:dur="10"/>
     </mc:Choice>
     <mc:Fallback>
@@ -19891,7 +19594,6 @@
               <a:rPr lang="pl-PL" u="sng" dirty="0" smtClean="0"/>
               <a:t>https://github.com/m-kolodziejski/exercise3</a:t>
             </a:r>
-            <a:endParaRPr lang="pl-PL" u="sng" dirty="0" smtClean="0"/>
           </a:p>
           <a:p>
             <a:pPr lvl="1"/>
@@ -19924,13 +19626,8 @@
             <a:pPr lvl="2"/>
             <a:r>
               <a:rPr lang="pl-PL" dirty="0" smtClean="0"/>
-              <a:t>git clone </a:t>
-            </a:r>
-            <a:r>
-              <a:rPr lang="pl-PL" dirty="0" smtClean="0"/>
-              <a:t>https://github.com/m-kolodziejski/exercise3.git</a:t>
-            </a:r>
-            <a:endParaRPr lang="pl-PL" dirty="0" smtClean="0"/>
+              <a:t>git clone https://github.com/m-kolodziejski/exercise3.git</a:t>
+            </a:r>
           </a:p>
           <a:p>
             <a:pPr lvl="1"/>
@@ -19986,7 +19683,7 @@
     </p:spTree>
     <p:extLst>
       <p:ext uri="{BB962C8B-B14F-4D97-AF65-F5344CB8AC3E}">
-        <p14:creationId xmlns="" xmlns:p14="http://schemas.microsoft.com/office/powerpoint/2010/main" val="2411064202"/>
+        <p14:creationId xmlns:p14="http://schemas.microsoft.com/office/powerpoint/2010/main" xmlns="" val="2411064202"/>
       </p:ext>
     </p:extLst>
   </p:cSld>
@@ -19994,7 +19691,7 @@
     <a:masterClrMapping/>
   </p:clrMapOvr>
   <mc:AlternateContent xmlns:mc="http://schemas.openxmlformats.org/markup-compatibility/2006">
-    <mc:Choice xmlns="" xmlns:p14="http://schemas.microsoft.com/office/powerpoint/2010/main" Requires="p14">
+    <mc:Choice xmlns:p14="http://schemas.microsoft.com/office/powerpoint/2010/main" xmlns="" Requires="p14">
       <p:transition p14:dur="0"/>
     </mc:Choice>
     <mc:Fallback>
@@ -20141,7 +19838,7 @@
     </p:spTree>
     <p:extLst>
       <p:ext uri="{BB962C8B-B14F-4D97-AF65-F5344CB8AC3E}">
-        <p14:creationId xmlns="" xmlns:p14="http://schemas.microsoft.com/office/powerpoint/2010/main" val="1022935673"/>
+        <p14:creationId xmlns:p14="http://schemas.microsoft.com/office/powerpoint/2010/main" xmlns="" val="1022935673"/>
       </p:ext>
     </p:extLst>
   </p:cSld>
@@ -20149,7 +19846,7 @@
     <a:masterClrMapping/>
   </p:clrMapOvr>
   <mc:AlternateContent xmlns:mc="http://schemas.openxmlformats.org/markup-compatibility/2006">
-    <mc:Choice xmlns="" xmlns:p14="http://schemas.microsoft.com/office/powerpoint/2010/main" Requires="p14">
+    <mc:Choice xmlns:p14="http://schemas.microsoft.com/office/powerpoint/2010/main" xmlns="" Requires="p14">
       <p:transition p14:dur="10"/>
     </mc:Choice>
     <mc:Fallback>
@@ -20438,7 +20135,7 @@
   <a:extraClrSchemeLst/>
   <a:extLst>
     <a:ext uri="{05A4C25C-085E-4340-85A3-A5531E510DB2}">
-      <thm15:themeFamily xmlns:thm15="http://schemas.microsoft.com/office/thememl/2012/main" xmlns="" name="GFT_Chartpool_2015.pptx" id="{A28C9458-9558-44C8-89F4-D7A2CBC04405}" vid="{0F156D25-70FA-498B-891B-4FDE46BF1046}"/>
+      <thm15:themeFamily xmlns="" xmlns:thm15="http://schemas.microsoft.com/office/thememl/2012/main" name="GFT_Chartpool_2015.pptx" id="{A28C9458-9558-44C8-89F4-D7A2CBC04405}" vid="{0F156D25-70FA-498B-891B-4FDE46BF1046}"/>
     </a:ext>
   </a:extLst>
 </a:theme>
@@ -21085,12 +20782,38 @@
 </file>
 
 <file path=customXml/item1.xml><?xml version="1.0" encoding="utf-8"?>
-<?mso-contentType ?>
-<FormTemplates xmlns="http://schemas.microsoft.com/sharepoint/v3/contenttype/forms">
-  <Display>DocumentLibraryForm</Display>
-  <Edit>DocumentLibraryForm</Edit>
-  <New>DocumentLibraryForm</New>
-</FormTemplates>
+<p:properties xmlns:p="http://schemas.microsoft.com/office/2006/metadata/properties" xmlns:xsi="http://www.w3.org/2001/XMLSchema-instance" xmlns:pc="http://schemas.microsoft.com/office/infopath/2007/PartnerControls">
+  <documentManagement>
+    <_dlc_DocId xmlns="727178e8-9586-4f49-8e7b-77af9c2fb085">CVD5QAC74SYH-2-13943</_dlc_DocId>
+    <_dlc_DocIdUrl xmlns="727178e8-9586-4f49-8e7b-77af9c2fb085">
+      <Url>https://share.gft.com/sites/Corporate-Marketing/_layouts/DocIdRedir.aspx?ID=CVD5QAC74SYH-2-13943</Url>
+      <Description>CVD5QAC74SYH-2-13943</Description>
+    </_dlc_DocIdUrl>
+    <Functional_x0020_Area xmlns="e44e039f-c551-4112-981c-456f1b630ef1">Functional Area 1</Functional_x0020_Area>
+    <Reference_x0020_Title xmlns="e44e039f-c551-4112-981c-456f1b630ef1" xsi:nil="true"/>
+    <Area xmlns="e44e039f-c551-4112-981c-456f1b630ef1">Area 1</Area>
+    <Project_x0020_size_x0020__x0028_resources_x0029_ xmlns="e44e039f-c551-4112-981c-456f1b630ef1" xsi:nil="true"/>
+    <Comments xmlns="e44e039f-c551-4112-981c-456f1b630ef1" xsi:nil="true"/>
+    <Business_x0020_Sector xmlns="e44e039f-c551-4112-981c-456f1b630ef1">Banking</Business_x0020_Sector>
+    <Client_x0020_Category xmlns="e44e039f-c551-4112-981c-456f1b630ef1">Central</Client_x0020_Category>
+    <Methods_x0020_and_x0020_standards xmlns="e44e039f-c551-4112-981c-456f1b630ef1" xsi:nil="true"/>
+    <Responsible xmlns="e44e039f-c551-4112-981c-456f1b630ef1">Marek Strejczek</Responsible>
+    <Client_x0020_Name xmlns="e44e039f-c551-4112-981c-456f1b630ef1" xsi:nil="true"/>
+    <Client_x0020_approval xmlns="e44e039f-c551-4112-981c-456f1b630ef1">No</Client_x0020_approval>
+    <Plattform_x0020__x0026__x0020_tools xmlns="e44e039f-c551-4112-981c-456f1b630ef1" xsi:nil="true"/>
+    <Project_x0020_ID xmlns="e44e039f-c551-4112-981c-456f1b630ef1" xsi:nil="true"/>
+    <Description0 xmlns="e44e039f-c551-4112-981c-456f1b630ef1" xsi:nil="true"/>
+    <Author_x0020__x002f__x0020_Contact xmlns="e44e039f-c551-4112-981c-456f1b630ef1">
+      <UserInfo>
+        <DisplayName/>
+        <AccountId xsi:nil="true"/>
+        <AccountType/>
+      </UserInfo>
+    </Author_x0020__x002f__x0020_Contact>
+    <Client_x0020_Country xmlns="e44e039f-c551-4112-981c-456f1b630ef1">Germany</Client_x0020_Country>
+    <Year xmlns="e44e039f-c551-4112-981c-456f1b630ef1" xsi:nil="true"/>
+  </documentManagement>
+</p:properties>
 </file>
 
 <file path=customXml/item2.xml><?xml version="1.0" encoding="utf-8"?>
@@ -21591,38 +21314,12 @@
 </file>
 
 <file path=customXml/item3.xml><?xml version="1.0" encoding="utf-8"?>
-<p:properties xmlns:p="http://schemas.microsoft.com/office/2006/metadata/properties" xmlns:xsi="http://www.w3.org/2001/XMLSchema-instance" xmlns:pc="http://schemas.microsoft.com/office/infopath/2007/PartnerControls">
-  <documentManagement>
-    <_dlc_DocId xmlns="727178e8-9586-4f49-8e7b-77af9c2fb085">CVD5QAC74SYH-2-13943</_dlc_DocId>
-    <_dlc_DocIdUrl xmlns="727178e8-9586-4f49-8e7b-77af9c2fb085">
-      <Url>https://share.gft.com/sites/Corporate-Marketing/_layouts/DocIdRedir.aspx?ID=CVD5QAC74SYH-2-13943</Url>
-      <Description>CVD5QAC74SYH-2-13943</Description>
-    </_dlc_DocIdUrl>
-    <Functional_x0020_Area xmlns="e44e039f-c551-4112-981c-456f1b630ef1">Functional Area 1</Functional_x0020_Area>
-    <Reference_x0020_Title xmlns="e44e039f-c551-4112-981c-456f1b630ef1" xsi:nil="true"/>
-    <Area xmlns="e44e039f-c551-4112-981c-456f1b630ef1">Area 1</Area>
-    <Project_x0020_size_x0020__x0028_resources_x0029_ xmlns="e44e039f-c551-4112-981c-456f1b630ef1" xsi:nil="true"/>
-    <Comments xmlns="e44e039f-c551-4112-981c-456f1b630ef1" xsi:nil="true"/>
-    <Business_x0020_Sector xmlns="e44e039f-c551-4112-981c-456f1b630ef1">Banking</Business_x0020_Sector>
-    <Client_x0020_Category xmlns="e44e039f-c551-4112-981c-456f1b630ef1">Central</Client_x0020_Category>
-    <Methods_x0020_and_x0020_standards xmlns="e44e039f-c551-4112-981c-456f1b630ef1" xsi:nil="true"/>
-    <Responsible xmlns="e44e039f-c551-4112-981c-456f1b630ef1">Marek Strejczek</Responsible>
-    <Client_x0020_Name xmlns="e44e039f-c551-4112-981c-456f1b630ef1" xsi:nil="true"/>
-    <Client_x0020_approval xmlns="e44e039f-c551-4112-981c-456f1b630ef1">No</Client_x0020_approval>
-    <Plattform_x0020__x0026__x0020_tools xmlns="e44e039f-c551-4112-981c-456f1b630ef1" xsi:nil="true"/>
-    <Project_x0020_ID xmlns="e44e039f-c551-4112-981c-456f1b630ef1" xsi:nil="true"/>
-    <Description0 xmlns="e44e039f-c551-4112-981c-456f1b630ef1" xsi:nil="true"/>
-    <Author_x0020__x002f__x0020_Contact xmlns="e44e039f-c551-4112-981c-456f1b630ef1">
-      <UserInfo>
-        <DisplayName/>
-        <AccountId xsi:nil="true"/>
-        <AccountType/>
-      </UserInfo>
-    </Author_x0020__x002f__x0020_Contact>
-    <Client_x0020_Country xmlns="e44e039f-c551-4112-981c-456f1b630ef1">Germany</Client_x0020_Country>
-    <Year xmlns="e44e039f-c551-4112-981c-456f1b630ef1" xsi:nil="true"/>
-  </documentManagement>
-</p:properties>
+<?mso-contentType ?>
+<FormTemplates xmlns="http://schemas.microsoft.com/sharepoint/v3/contenttype/forms">
+  <Display>DocumentLibraryForm</Display>
+  <Edit>DocumentLibraryForm</Edit>
+  <New>DocumentLibraryForm</New>
+</FormTemplates>
 </file>
 
 <file path=customXml/item4.xml><?xml version="1.0" encoding="utf-8"?>
@@ -21672,9 +21369,18 @@
 </file>
 
 <file path=customXml/itemProps1.xml><?xml version="1.0" encoding="utf-8"?>
-<ds:datastoreItem xmlns:ds="http://schemas.openxmlformats.org/officeDocument/2006/customXml" ds:itemID="{9217953E-6BB7-40C6-9A84-608D0A8D65EC}">
+<ds:datastoreItem xmlns:ds="http://schemas.openxmlformats.org/officeDocument/2006/customXml" ds:itemID="{7445AAF4-B73F-4E3A-B9D2-4DDAE0F1BE8A}">
   <ds:schemaRefs>
-    <ds:schemaRef ds:uri="http://schemas.microsoft.com/sharepoint/v3/contenttype/forms"/>
+    <ds:schemaRef ds:uri="http://schemas.microsoft.com/office/2006/documentManagement/types"/>
+    <ds:schemaRef ds:uri="http://schemas.openxmlformats.org/package/2006/metadata/core-properties"/>
+    <ds:schemaRef ds:uri="727178e8-9586-4f49-8e7b-77af9c2fb085"/>
+    <ds:schemaRef ds:uri="http://purl.org/dc/elements/1.1/"/>
+    <ds:schemaRef ds:uri="http://schemas.microsoft.com/office/2006/metadata/properties"/>
+    <ds:schemaRef ds:uri="e44e039f-c551-4112-981c-456f1b630ef1"/>
+    <ds:schemaRef ds:uri="http://purl.org/dc/terms/"/>
+    <ds:schemaRef ds:uri="http://schemas.microsoft.com/office/infopath/2007/PartnerControls"/>
+    <ds:schemaRef ds:uri="http://www.w3.org/XML/1998/namespace"/>
+    <ds:schemaRef ds:uri="http://purl.org/dc/dcmitype/"/>
   </ds:schemaRefs>
 </ds:datastoreItem>
 </file>
@@ -21699,18 +21405,9 @@
 </file>
 
 <file path=customXml/itemProps3.xml><?xml version="1.0" encoding="utf-8"?>
-<ds:datastoreItem xmlns:ds="http://schemas.openxmlformats.org/officeDocument/2006/customXml" ds:itemID="{7445AAF4-B73F-4E3A-B9D2-4DDAE0F1BE8A}">
+<ds:datastoreItem xmlns:ds="http://schemas.openxmlformats.org/officeDocument/2006/customXml" ds:itemID="{9217953E-6BB7-40C6-9A84-608D0A8D65EC}">
   <ds:schemaRefs>
-    <ds:schemaRef ds:uri="http://schemas.microsoft.com/office/2006/documentManagement/types"/>
-    <ds:schemaRef ds:uri="http://schemas.openxmlformats.org/package/2006/metadata/core-properties"/>
-    <ds:schemaRef ds:uri="727178e8-9586-4f49-8e7b-77af9c2fb085"/>
-    <ds:schemaRef ds:uri="http://purl.org/dc/elements/1.1/"/>
-    <ds:schemaRef ds:uri="http://schemas.microsoft.com/office/2006/metadata/properties"/>
-    <ds:schemaRef ds:uri="e44e039f-c551-4112-981c-456f1b630ef1"/>
-    <ds:schemaRef ds:uri="http://purl.org/dc/terms/"/>
-    <ds:schemaRef ds:uri="http://schemas.microsoft.com/office/infopath/2007/PartnerControls"/>
-    <ds:schemaRef ds:uri="http://www.w3.org/XML/1998/namespace"/>
-    <ds:schemaRef ds:uri="http://purl.org/dc/dcmitype/"/>
+    <ds:schemaRef ds:uri="http://schemas.microsoft.com/sharepoint/v3/contenttype/forms"/>
   </ds:schemaRefs>
 </ds:datastoreItem>
 </file>

</xml_diff>